<commit_message>
Minor fixes to analyses
</commit_message>
<xml_diff>
--- a/PanicModelxRF_prelim_analyses.pptx
+++ b/PanicModelxRF_prelim_analyses.pptx
@@ -6,20 +6,21 @@
     <p:sldMasterId id="2147483660" r:id="rId2"/>
   </p:sldMasterIdLst>
   <p:notesMasterIdLst>
-    <p:notesMasterId r:id="rId14"/>
+    <p:notesMasterId r:id="rId15"/>
   </p:notesMasterIdLst>
   <p:sldIdLst>
     <p:sldId id="256" r:id="rId3"/>
     <p:sldId id="3274" r:id="rId4"/>
     <p:sldId id="271" r:id="rId5"/>
-    <p:sldId id="258" r:id="rId6"/>
-    <p:sldId id="261" r:id="rId7"/>
-    <p:sldId id="262" r:id="rId8"/>
-    <p:sldId id="263" r:id="rId9"/>
-    <p:sldId id="265" r:id="rId10"/>
-    <p:sldId id="264" r:id="rId11"/>
-    <p:sldId id="266" r:id="rId12"/>
-    <p:sldId id="267" r:id="rId13"/>
+    <p:sldId id="3275" r:id="rId6"/>
+    <p:sldId id="258" r:id="rId7"/>
+    <p:sldId id="261" r:id="rId8"/>
+    <p:sldId id="262" r:id="rId9"/>
+    <p:sldId id="263" r:id="rId10"/>
+    <p:sldId id="265" r:id="rId11"/>
+    <p:sldId id="264" r:id="rId12"/>
+    <p:sldId id="266" r:id="rId13"/>
+    <p:sldId id="267" r:id="rId14"/>
   </p:sldIdLst>
   <p:sldSz cx="12192000" cy="6858000"/>
   <p:notesSz cx="6858000" cy="9144000"/>
@@ -7274,6 +7275,198 @@
         <p:cNvPr id="1" name="">
           <a:extLst>
             <a:ext uri="{FF2B5EF4-FFF2-40B4-BE49-F238E27FC236}">
+              <a16:creationId xmlns:a16="http://schemas.microsoft.com/office/drawing/2014/main" id="{7990B1C8-EC6B-629A-CFEC-A0F92F2B7F23}"/>
+            </a:ext>
+          </a:extLst>
+        </p:cNvPr>
+        <p:cNvGrpSpPr/>
+        <p:nvPr/>
+      </p:nvGrpSpPr>
+      <p:grpSpPr>
+        <a:xfrm>
+          <a:off x="0" y="0"/>
+          <a:ext cx="0" cy="0"/>
+          <a:chOff x="0" y="0"/>
+          <a:chExt cx="0" cy="0"/>
+        </a:xfrm>
+      </p:grpSpPr>
+      <p:sp>
+        <p:nvSpPr>
+          <p:cNvPr id="2" name="Title 1">
+            <a:extLst>
+              <a:ext uri="{FF2B5EF4-FFF2-40B4-BE49-F238E27FC236}">
+                <a16:creationId xmlns:a16="http://schemas.microsoft.com/office/drawing/2014/main" id="{1646EA6E-7B7C-05B8-F380-5B350807B4DD}"/>
+              </a:ext>
+            </a:extLst>
+          </p:cNvPr>
+          <p:cNvSpPr>
+            <a:spLocks noGrp="1"/>
+          </p:cNvSpPr>
+          <p:nvPr>
+            <p:ph type="title"/>
+          </p:nvPr>
+        </p:nvSpPr>
+        <p:spPr>
+          <a:xfrm>
+            <a:off x="838200" y="0"/>
+            <a:ext cx="10515600" cy="1325563"/>
+          </a:xfrm>
+        </p:spPr>
+        <p:txBody>
+          <a:bodyPr/>
+          <a:lstStyle/>
+          <a:p>
+            <a:r>
+              <a:rPr lang="en-US" dirty="0"/>
+              <a:t>PDSS Symptom Trajectory by Tx Group</a:t>
+            </a:r>
+          </a:p>
+        </p:txBody>
+      </p:sp>
+      <p:pic>
+        <p:nvPicPr>
+          <p:cNvPr id="5" name="Picture 4">
+            <a:extLst>
+              <a:ext uri="{FF2B5EF4-FFF2-40B4-BE49-F238E27FC236}">
+                <a16:creationId xmlns:a16="http://schemas.microsoft.com/office/drawing/2014/main" id="{3575B5DF-F698-1304-C2EE-525FE57DF604}"/>
+              </a:ext>
+            </a:extLst>
+          </p:cNvPr>
+          <p:cNvPicPr>
+            <a:picLocks noChangeAspect="1"/>
+          </p:cNvPicPr>
+          <p:nvPr/>
+        </p:nvPicPr>
+        <p:blipFill>
+          <a:blip r:embed="rId2"/>
+          <a:srcRect t="5217"/>
+          <a:stretch/>
+        </p:blipFill>
+        <p:spPr>
+          <a:xfrm>
+            <a:off x="720320" y="1179789"/>
+            <a:ext cx="9366318" cy="5360122"/>
+          </a:xfrm>
+          <a:prstGeom prst="rect">
+            <a:avLst/>
+          </a:prstGeom>
+        </p:spPr>
+      </p:pic>
+      <p:sp>
+        <p:nvSpPr>
+          <p:cNvPr id="6" name="TextBox 5">
+            <a:extLst>
+              <a:ext uri="{FF2B5EF4-FFF2-40B4-BE49-F238E27FC236}">
+                <a16:creationId xmlns:a16="http://schemas.microsoft.com/office/drawing/2014/main" id="{1322B0E6-8D91-5A01-7E04-95F545ECFAAF}"/>
+              </a:ext>
+            </a:extLst>
+          </p:cNvPr>
+          <p:cNvSpPr txBox="1"/>
+          <p:nvPr/>
+        </p:nvSpPr>
+        <p:spPr>
+          <a:xfrm>
+            <a:off x="9591383" y="5207759"/>
+            <a:ext cx="1408847" cy="461665"/>
+          </a:xfrm>
+          <a:prstGeom prst="rect">
+            <a:avLst/>
+          </a:prstGeom>
+          <a:noFill/>
+        </p:spPr>
+        <p:txBody>
+          <a:bodyPr wrap="none" rtlCol="0">
+            <a:spAutoFit/>
+          </a:bodyPr>
+          <a:lstStyle/>
+          <a:p>
+            <a:r>
+              <a:rPr lang="en-US" sz="2400" i="1" dirty="0" err="1"/>
+              <a:t>N</a:t>
+            </a:r>
+            <a:r>
+              <a:rPr lang="en-US" sz="2400" i="1" baseline="-25000" dirty="0" err="1"/>
+              <a:t>Panic</a:t>
+            </a:r>
+            <a:r>
+              <a:rPr lang="en-US" sz="2400" i="1" baseline="-25000" dirty="0"/>
+              <a:t> </a:t>
+            </a:r>
+            <a:r>
+              <a:rPr lang="en-US" sz="2400" dirty="0"/>
+              <a:t>= 13</a:t>
+            </a:r>
+          </a:p>
+        </p:txBody>
+      </p:sp>
+      <p:sp>
+        <p:nvSpPr>
+          <p:cNvPr id="7" name="TextBox 6">
+            <a:extLst>
+              <a:ext uri="{FF2B5EF4-FFF2-40B4-BE49-F238E27FC236}">
+                <a16:creationId xmlns:a16="http://schemas.microsoft.com/office/drawing/2014/main" id="{99E72B7A-4181-8FAA-CDB3-8A201E560BFA}"/>
+              </a:ext>
+            </a:extLst>
+          </p:cNvPr>
+          <p:cNvSpPr txBox="1"/>
+          <p:nvPr/>
+        </p:nvSpPr>
+        <p:spPr>
+          <a:xfrm>
+            <a:off x="9591383" y="5770976"/>
+            <a:ext cx="1441420" cy="461665"/>
+          </a:xfrm>
+          <a:prstGeom prst="rect">
+            <a:avLst/>
+          </a:prstGeom>
+          <a:noFill/>
+        </p:spPr>
+        <p:txBody>
+          <a:bodyPr wrap="none" rtlCol="0">
+            <a:spAutoFit/>
+          </a:bodyPr>
+          <a:lstStyle/>
+          <a:p>
+            <a:r>
+              <a:rPr lang="en-US" sz="2400" i="1" dirty="0" err="1"/>
+              <a:t>N</a:t>
+            </a:r>
+            <a:r>
+              <a:rPr lang="en-US" sz="2400" i="1" baseline="-25000" dirty="0" err="1"/>
+              <a:t>Other</a:t>
+            </a:r>
+            <a:r>
+              <a:rPr lang="en-US" sz="2400" i="1" baseline="-25000" dirty="0"/>
+              <a:t> </a:t>
+            </a:r>
+            <a:r>
+              <a:rPr lang="en-US" sz="2400" dirty="0"/>
+              <a:t>= 38</a:t>
+            </a:r>
+          </a:p>
+        </p:txBody>
+      </p:sp>
+    </p:spTree>
+    <p:extLst>
+      <p:ext uri="{BB962C8B-B14F-4D97-AF65-F5344CB8AC3E}">
+        <p14:creationId xmlns:p14="http://schemas.microsoft.com/office/powerpoint/2010/main" val="3175728231"/>
+      </p:ext>
+    </p:extLst>
+  </p:cSld>
+  <p:clrMapOvr>
+    <a:masterClrMapping/>
+  </p:clrMapOvr>
+</p:sld>
+</file>
+
+<file path=ppt/slides/slide11.xml><?xml version="1.0" encoding="utf-8"?>
+<p:sld xmlns:a="http://schemas.openxmlformats.org/drawingml/2006/main" xmlns:r="http://schemas.openxmlformats.org/officeDocument/2006/relationships" xmlns:p="http://schemas.openxmlformats.org/presentationml/2006/main">
+  <p:cSld>
+    <p:spTree>
+      <p:nvGrpSpPr>
+        <p:cNvPr id="1" name="">
+          <a:extLst>
+            <a:ext uri="{FF2B5EF4-FFF2-40B4-BE49-F238E27FC236}">
               <a16:creationId xmlns:a16="http://schemas.microsoft.com/office/drawing/2014/main" id="{22958894-DF7C-97C7-C2F7-301A7F703B9D}"/>
             </a:ext>
           </a:extLst>
@@ -7320,7 +7513,15 @@
             <a:pPr algn="ctr"/>
             <a:r>
               <a:rPr lang="en-US" sz="3600" dirty="0"/>
-              <a:t>Change in PAI-2 Scores During Module 1 (Psychoeducation)</a:t>
+              <a:t>Change in PAI-2 Scores During Psychoeducation Module (</a:t>
+            </a:r>
+            <a:r>
+              <a:rPr lang="en-US" sz="3600" i="1" dirty="0"/>
+              <a:t>N</a:t>
+            </a:r>
+            <a:r>
+              <a:rPr lang="en-US" sz="3600" dirty="0"/>
+              <a:t>=36)</a:t>
             </a:r>
           </a:p>
         </p:txBody>
@@ -7368,7 +7569,7 @@
 </p:sld>
 </file>
 
-<file path=ppt/slides/slide11.xml><?xml version="1.0" encoding="utf-8"?>
+<file path=ppt/slides/slide12.xml><?xml version="1.0" encoding="utf-8"?>
 <p:sld xmlns:a="http://schemas.openxmlformats.org/drawingml/2006/main" xmlns:r="http://schemas.openxmlformats.org/officeDocument/2006/relationships" xmlns:p="http://schemas.openxmlformats.org/presentationml/2006/main">
   <p:cSld>
     <p:spTree>
@@ -7422,7 +7623,15 @@
             <a:pPr algn="ctr"/>
             <a:r>
               <a:rPr lang="en-US" sz="3600" dirty="0"/>
-              <a:t>Comparison of PAI-2 Network Structures Before and After Psychoeducation Module</a:t>
+              <a:t>Comparison of PAI-2 Network Structures Before and After Psychoeducation Module (</a:t>
+            </a:r>
+            <a:r>
+              <a:rPr lang="en-US" sz="3600" i="1" dirty="0"/>
+              <a:t>N</a:t>
+            </a:r>
+            <a:r>
+              <a:rPr lang="en-US" sz="3600" dirty="0"/>
+              <a:t>=36)</a:t>
             </a:r>
           </a:p>
         </p:txBody>
@@ -8316,6 +8525,130 @@
   <p:cSld>
     <p:spTree>
       <p:nvGrpSpPr>
+        <p:cNvPr id="1" name=""/>
+        <p:cNvGrpSpPr/>
+        <p:nvPr/>
+      </p:nvGrpSpPr>
+      <p:grpSpPr>
+        <a:xfrm>
+          <a:off x="0" y="0"/>
+          <a:ext cx="0" cy="0"/>
+          <a:chOff x="0" y="0"/>
+          <a:chExt cx="0" cy="0"/>
+        </a:xfrm>
+      </p:grpSpPr>
+      <p:sp>
+        <p:nvSpPr>
+          <p:cNvPr id="2" name="Title 1">
+            <a:extLst>
+              <a:ext uri="{FF2B5EF4-FFF2-40B4-BE49-F238E27FC236}">
+                <a16:creationId xmlns:a16="http://schemas.microsoft.com/office/drawing/2014/main" id="{F67F0DEA-6430-0DF6-316E-AECCE4443833}"/>
+              </a:ext>
+            </a:extLst>
+          </p:cNvPr>
+          <p:cNvSpPr>
+            <a:spLocks noGrp="1"/>
+          </p:cNvSpPr>
+          <p:nvPr>
+            <p:ph type="title"/>
+          </p:nvPr>
+        </p:nvSpPr>
+        <p:spPr/>
+        <p:txBody>
+          <a:bodyPr/>
+          <a:lstStyle/>
+          <a:p>
+            <a:r>
+              <a:rPr lang="en-US" dirty="0"/>
+              <a:t>Additional Protocol Info</a:t>
+            </a:r>
+          </a:p>
+        </p:txBody>
+      </p:sp>
+      <p:sp>
+        <p:nvSpPr>
+          <p:cNvPr id="3" name="Content Placeholder 2">
+            <a:extLst>
+              <a:ext uri="{FF2B5EF4-FFF2-40B4-BE49-F238E27FC236}">
+                <a16:creationId xmlns:a16="http://schemas.microsoft.com/office/drawing/2014/main" id="{648B5598-0F51-9335-274B-20F3E9C47E6E}"/>
+              </a:ext>
+            </a:extLst>
+          </p:cNvPr>
+          <p:cNvSpPr>
+            <a:spLocks noGrp="1"/>
+          </p:cNvSpPr>
+          <p:nvPr>
+            <p:ph idx="1"/>
+          </p:nvPr>
+        </p:nvSpPr>
+        <p:spPr/>
+        <p:txBody>
+          <a:bodyPr/>
+          <a:lstStyle/>
+          <a:p>
+            <a:r>
+              <a:rPr lang="en-US" dirty="0"/>
+              <a:t>Participants above threshold for Panic Disorder or Agoraphobia were eligible for the Panic Disorder Treatment Package</a:t>
+            </a:r>
+          </a:p>
+          <a:p>
+            <a:endParaRPr lang="en-US" dirty="0"/>
+          </a:p>
+          <a:p>
+            <a:r>
+              <a:rPr lang="en-US" dirty="0"/>
+              <a:t>Only participants who were above threshold for Panic Disorder received repeated PDSS assessments</a:t>
+            </a:r>
+          </a:p>
+        </p:txBody>
+      </p:sp>
+      <p:sp>
+        <p:nvSpPr>
+          <p:cNvPr id="4" name="Slide Number Placeholder 3">
+            <a:extLst>
+              <a:ext uri="{FF2B5EF4-FFF2-40B4-BE49-F238E27FC236}">
+                <a16:creationId xmlns:a16="http://schemas.microsoft.com/office/drawing/2014/main" id="{45FD514E-5C8B-B2C8-585F-3AA688D60605}"/>
+              </a:ext>
+            </a:extLst>
+          </p:cNvPr>
+          <p:cNvSpPr>
+            <a:spLocks noGrp="1"/>
+          </p:cNvSpPr>
+          <p:nvPr>
+            <p:ph type="sldNum" sz="quarter" idx="12"/>
+          </p:nvPr>
+        </p:nvSpPr>
+        <p:spPr/>
+        <p:txBody>
+          <a:bodyPr/>
+          <a:lstStyle/>
+          <a:p>
+            <a:fld id="{81E4CEA9-D950-0D46-BB45-CD1AC7F3F874}" type="slidenum">
+              <a:rPr lang="en-US" smtClean="0"/>
+              <a:t>4</a:t>
+            </a:fld>
+            <a:endParaRPr lang="en-US"/>
+          </a:p>
+        </p:txBody>
+      </p:sp>
+    </p:spTree>
+    <p:extLst>
+      <p:ext uri="{BB962C8B-B14F-4D97-AF65-F5344CB8AC3E}">
+        <p14:creationId xmlns:p14="http://schemas.microsoft.com/office/powerpoint/2010/main" val="3898549881"/>
+      </p:ext>
+    </p:extLst>
+  </p:cSld>
+  <p:clrMapOvr>
+    <a:masterClrMapping/>
+  </p:clrMapOvr>
+</p:sld>
+</file>
+
+<file path=ppt/slides/slide5.xml><?xml version="1.0" encoding="utf-8"?>
+<p:sld xmlns:a="http://schemas.openxmlformats.org/drawingml/2006/main" xmlns:r="http://schemas.openxmlformats.org/officeDocument/2006/relationships" xmlns:p="http://schemas.openxmlformats.org/presentationml/2006/main">
+  <p:cSld>
+    <p:spTree>
+      <p:nvGrpSpPr>
         <p:cNvPr id="1" name="">
           <a:extLst>
             <a:ext uri="{FF2B5EF4-FFF2-40B4-BE49-F238E27FC236}">
@@ -8352,81 +8685,2197 @@
         </p:nvSpPr>
         <p:spPr>
           <a:xfrm>
-            <a:off x="6381474" y="501293"/>
-            <a:ext cx="5377070" cy="1325563"/>
+            <a:off x="-1" y="0"/>
+            <a:ext cx="12192001" cy="1325563"/>
           </a:xfrm>
         </p:spPr>
         <p:txBody>
           <a:bodyPr>
-            <a:normAutofit fontScale="90000"/>
+            <a:normAutofit/>
           </a:bodyPr>
           <a:lstStyle/>
           <a:p>
-            <a:r>
-              <a:rPr lang="en-US" dirty="0"/>
+            <a:pPr algn="ctr"/>
+            <a:r>
+              <a:rPr lang="en-US" sz="4000" dirty="0"/>
               <a:t>Demographics and Clinical Characteristics at Baseline</a:t>
             </a:r>
           </a:p>
         </p:txBody>
       </p:sp>
-      <p:pic>
-        <p:nvPicPr>
-          <p:cNvPr id="4" name="Picture 3">
-            <a:extLst>
-              <a:ext uri="{FF2B5EF4-FFF2-40B4-BE49-F238E27FC236}">
-                <a16:creationId xmlns:a16="http://schemas.microsoft.com/office/drawing/2014/main" id="{413C712B-9336-1C16-8DE1-FCB5417F5CD4}"/>
-              </a:ext>
-            </a:extLst>
-          </p:cNvPr>
-          <p:cNvPicPr>
-            <a:picLocks noChangeAspect="1"/>
-          </p:cNvPicPr>
+      <p:graphicFrame>
+        <p:nvGraphicFramePr>
+          <p:cNvPr id="6" name="Table 5">
+            <a:extLst>
+              <a:ext uri="{FF2B5EF4-FFF2-40B4-BE49-F238E27FC236}">
+                <a16:creationId xmlns:a16="http://schemas.microsoft.com/office/drawing/2014/main" id="{5A4C880D-468F-8C28-003B-DB11818C3F66}"/>
+              </a:ext>
+            </a:extLst>
+          </p:cNvPr>
+          <p:cNvGraphicFramePr>
+            <a:graphicFrameLocks noGrp="1"/>
+          </p:cNvGraphicFramePr>
+          <p:nvPr>
+            <p:extLst>
+              <p:ext uri="{D42A27DB-BD31-4B8C-83A1-F6EECF244321}">
+                <p14:modId xmlns:p14="http://schemas.microsoft.com/office/powerpoint/2010/main" val="1314997266"/>
+              </p:ext>
+            </p:extLst>
+          </p:nvPr>
+        </p:nvGraphicFramePr>
+        <p:xfrm>
+          <a:off x="1061832" y="1694895"/>
+          <a:ext cx="4835387" cy="4560570"/>
+        </p:xfrm>
+        <a:graphic>
+          <a:graphicData uri="http://schemas.openxmlformats.org/drawingml/2006/table">
+            <a:tbl>
+              <a:tblPr>
+                <a:tableStyleId>{6E25E649-3F16-4E02-A733-19D2CDBF48F0}</a:tableStyleId>
+              </a:tblPr>
+              <a:tblGrid>
+                <a:gridCol w="2278071">
+                  <a:extLst>
+                    <a:ext uri="{9D8B030D-6E8A-4147-A177-3AD203B41FA5}">
+                      <a16:colId xmlns:a16="http://schemas.microsoft.com/office/drawing/2014/main" val="1733273198"/>
+                    </a:ext>
+                  </a:extLst>
+                </a:gridCol>
+                <a:gridCol w="1278658">
+                  <a:extLst>
+                    <a:ext uri="{9D8B030D-6E8A-4147-A177-3AD203B41FA5}">
+                      <a16:colId xmlns:a16="http://schemas.microsoft.com/office/drawing/2014/main" val="3612361795"/>
+                    </a:ext>
+                  </a:extLst>
+                </a:gridCol>
+                <a:gridCol w="1278658">
+                  <a:extLst>
+                    <a:ext uri="{9D8B030D-6E8A-4147-A177-3AD203B41FA5}">
+                      <a16:colId xmlns:a16="http://schemas.microsoft.com/office/drawing/2014/main" val="3230243426"/>
+                    </a:ext>
+                  </a:extLst>
+                </a:gridCol>
+              </a:tblGrid>
+              <a:tr h="234662">
+                <a:tc>
+                  <a:txBody>
+                    <a:bodyPr/>
+                    <a:lstStyle/>
+                    <a:p>
+                      <a:pPr algn="l" fontAlgn="b"/>
+                      <a:endParaRPr lang="en-US" sz="1600" b="0" i="0" u="none" strike="noStrike">
+                        <a:solidFill>
+                          <a:srgbClr val="000000"/>
+                        </a:solidFill>
+                        <a:effectLst/>
+                        <a:latin typeface="Aptos Narrow" panose="020B0004020202020204" pitchFamily="34" charset="0"/>
+                      </a:endParaRPr>
+                    </a:p>
+                  </a:txBody>
+                  <a:tcPr marL="9525" marR="9525" marT="9525" marB="0" anchor="b"/>
+                </a:tc>
+                <a:tc>
+                  <a:txBody>
+                    <a:bodyPr/>
+                    <a:lstStyle/>
+                    <a:p>
+                      <a:pPr algn="l" fontAlgn="b"/>
+                      <a:r>
+                        <a:rPr lang="en-US" sz="1600" b="0" u="none" strike="noStrike">
+                          <a:solidFill>
+                            <a:srgbClr val="000000"/>
+                          </a:solidFill>
+                          <a:effectLst/>
+                        </a:rPr>
+                        <a:t>Other</a:t>
+                      </a:r>
+                      <a:endParaRPr lang="en-US" sz="1600" b="0" i="0" u="none" strike="noStrike">
+                        <a:solidFill>
+                          <a:srgbClr val="000000"/>
+                        </a:solidFill>
+                        <a:effectLst/>
+                        <a:latin typeface="Aptos Narrow" panose="020B0004020202020204" pitchFamily="34" charset="0"/>
+                      </a:endParaRPr>
+                    </a:p>
+                  </a:txBody>
+                  <a:tcPr marL="9525" marR="9525" marT="9525" marB="0" anchor="b"/>
+                </a:tc>
+                <a:tc>
+                  <a:txBody>
+                    <a:bodyPr/>
+                    <a:lstStyle/>
+                    <a:p>
+                      <a:pPr algn="l" fontAlgn="b"/>
+                      <a:r>
+                        <a:rPr lang="en-US" sz="1600" b="0" u="none" strike="noStrike">
+                          <a:solidFill>
+                            <a:srgbClr val="000000"/>
+                          </a:solidFill>
+                          <a:effectLst/>
+                        </a:rPr>
+                        <a:t>Panic</a:t>
+                      </a:r>
+                      <a:endParaRPr lang="en-US" sz="1600" b="0" i="0" u="none" strike="noStrike">
+                        <a:solidFill>
+                          <a:srgbClr val="000000"/>
+                        </a:solidFill>
+                        <a:effectLst/>
+                        <a:latin typeface="Aptos Narrow" panose="020B0004020202020204" pitchFamily="34" charset="0"/>
+                      </a:endParaRPr>
+                    </a:p>
+                  </a:txBody>
+                  <a:tcPr marL="9525" marR="9525" marT="9525" marB="0" anchor="b"/>
+                </a:tc>
+                <a:extLst>
+                  <a:ext uri="{0D108BD9-81ED-4DB2-BD59-A6C34878D82A}">
+                    <a16:rowId xmlns:a16="http://schemas.microsoft.com/office/drawing/2014/main" val="4237650357"/>
+                  </a:ext>
+                </a:extLst>
+              </a:tr>
+              <a:tr h="234662">
+                <a:tc>
+                  <a:txBody>
+                    <a:bodyPr/>
+                    <a:lstStyle/>
+                    <a:p>
+                      <a:pPr algn="l" fontAlgn="b"/>
+                      <a:r>
+                        <a:rPr lang="en-US" sz="1600" b="0" u="none" strike="noStrike" dirty="0">
+                          <a:solidFill>
+                            <a:srgbClr val="000000"/>
+                          </a:solidFill>
+                          <a:effectLst/>
+                        </a:rPr>
+                        <a:t>Age </a:t>
+                      </a:r>
+                      <a:r>
+                        <a:rPr lang="en-US" sz="1600" b="0" i="1" u="none" strike="noStrike" dirty="0">
+                          <a:solidFill>
+                            <a:srgbClr val="000000"/>
+                          </a:solidFill>
+                          <a:effectLst/>
+                        </a:rPr>
+                        <a:t>M(SD)</a:t>
+                      </a:r>
+                      <a:endParaRPr lang="en-US" sz="1600" b="0" i="0" u="none" strike="noStrike" dirty="0">
+                        <a:solidFill>
+                          <a:srgbClr val="000000"/>
+                        </a:solidFill>
+                        <a:effectLst/>
+                        <a:latin typeface="Aptos Narrow" panose="020B0004020202020204" pitchFamily="34" charset="0"/>
+                      </a:endParaRPr>
+                    </a:p>
+                  </a:txBody>
+                  <a:tcPr marL="9525" marR="9525" marT="9525" marB="0" anchor="b"/>
+                </a:tc>
+                <a:tc>
+                  <a:txBody>
+                    <a:bodyPr/>
+                    <a:lstStyle/>
+                    <a:p>
+                      <a:pPr algn="l" fontAlgn="b"/>
+                      <a:r>
+                        <a:rPr lang="en-US" sz="1600" b="0" u="none" strike="noStrike" dirty="0">
+                          <a:solidFill>
+                            <a:srgbClr val="000000"/>
+                          </a:solidFill>
+                          <a:effectLst/>
+                        </a:rPr>
+                        <a:t>26.90 (6.48)</a:t>
+                      </a:r>
+                      <a:endParaRPr lang="en-US" sz="1600" b="0" i="0" u="none" strike="noStrike" dirty="0">
+                        <a:solidFill>
+                          <a:srgbClr val="000000"/>
+                        </a:solidFill>
+                        <a:effectLst/>
+                        <a:latin typeface="Aptos Narrow" panose="020B0004020202020204" pitchFamily="34" charset="0"/>
+                      </a:endParaRPr>
+                    </a:p>
+                  </a:txBody>
+                  <a:tcPr marL="9525" marR="9525" marT="9525" marB="0" anchor="b"/>
+                </a:tc>
+                <a:tc>
+                  <a:txBody>
+                    <a:bodyPr/>
+                    <a:lstStyle/>
+                    <a:p>
+                      <a:pPr algn="l" fontAlgn="b"/>
+                      <a:r>
+                        <a:rPr lang="en-US" sz="1600" b="0" u="none" strike="noStrike" dirty="0">
+                          <a:solidFill>
+                            <a:srgbClr val="000000"/>
+                          </a:solidFill>
+                          <a:effectLst/>
+                        </a:rPr>
+                        <a:t>27.79 (6.66)</a:t>
+                      </a:r>
+                      <a:endParaRPr lang="en-US" sz="1600" b="0" i="0" u="none" strike="noStrike" dirty="0">
+                        <a:solidFill>
+                          <a:srgbClr val="000000"/>
+                        </a:solidFill>
+                        <a:effectLst/>
+                        <a:latin typeface="Aptos Narrow" panose="020B0004020202020204" pitchFamily="34" charset="0"/>
+                      </a:endParaRPr>
+                    </a:p>
+                  </a:txBody>
+                  <a:tcPr marL="9525" marR="9525" marT="9525" marB="0" anchor="b"/>
+                </a:tc>
+                <a:extLst>
+                  <a:ext uri="{0D108BD9-81ED-4DB2-BD59-A6C34878D82A}">
+                    <a16:rowId xmlns:a16="http://schemas.microsoft.com/office/drawing/2014/main" val="2885765734"/>
+                  </a:ext>
+                </a:extLst>
+              </a:tr>
+              <a:tr h="234662">
+                <a:tc>
+                  <a:txBody>
+                    <a:bodyPr/>
+                    <a:lstStyle/>
+                    <a:p>
+                      <a:pPr algn="l" fontAlgn="b"/>
+                      <a:r>
+                        <a:rPr lang="en-US" sz="1600" b="0" u="none" strike="noStrike">
+                          <a:solidFill>
+                            <a:srgbClr val="000000"/>
+                          </a:solidFill>
+                          <a:effectLst/>
+                        </a:rPr>
+                        <a:t>Gender</a:t>
+                      </a:r>
+                      <a:endParaRPr lang="en-US" sz="1600" b="0" i="0" u="none" strike="noStrike">
+                        <a:solidFill>
+                          <a:srgbClr val="000000"/>
+                        </a:solidFill>
+                        <a:effectLst/>
+                        <a:latin typeface="Aptos Narrow" panose="020B0004020202020204" pitchFamily="34" charset="0"/>
+                      </a:endParaRPr>
+                    </a:p>
+                  </a:txBody>
+                  <a:tcPr marL="9525" marR="9525" marT="9525" marB="0" anchor="b"/>
+                </a:tc>
+                <a:tc>
+                  <a:txBody>
+                    <a:bodyPr/>
+                    <a:lstStyle/>
+                    <a:p>
+                      <a:pPr algn="l" fontAlgn="b"/>
+                      <a:endParaRPr lang="en-US" sz="1600" b="0" i="0" u="none" strike="noStrike">
+                        <a:solidFill>
+                          <a:srgbClr val="000000"/>
+                        </a:solidFill>
+                        <a:effectLst/>
+                        <a:latin typeface="Aptos Narrow" panose="020B0004020202020204" pitchFamily="34" charset="0"/>
+                      </a:endParaRPr>
+                    </a:p>
+                  </a:txBody>
+                  <a:tcPr marL="9525" marR="9525" marT="9525" marB="0" anchor="b"/>
+                </a:tc>
+                <a:tc>
+                  <a:txBody>
+                    <a:bodyPr/>
+                    <a:lstStyle/>
+                    <a:p>
+                      <a:pPr algn="l" fontAlgn="b"/>
+                      <a:endParaRPr lang="en-US" sz="1600" b="0" i="0" u="none" strike="noStrike">
+                        <a:solidFill>
+                          <a:srgbClr val="000000"/>
+                        </a:solidFill>
+                        <a:effectLst/>
+                        <a:latin typeface="Aptos Narrow" panose="020B0004020202020204" pitchFamily="34" charset="0"/>
+                      </a:endParaRPr>
+                    </a:p>
+                  </a:txBody>
+                  <a:tcPr marL="9525" marR="9525" marT="9525" marB="0" anchor="b"/>
+                </a:tc>
+                <a:extLst>
+                  <a:ext uri="{0D108BD9-81ED-4DB2-BD59-A6C34878D82A}">
+                    <a16:rowId xmlns:a16="http://schemas.microsoft.com/office/drawing/2014/main" val="2278142083"/>
+                  </a:ext>
+                </a:extLst>
+              </a:tr>
+              <a:tr h="234662">
+                <a:tc>
+                  <a:txBody>
+                    <a:bodyPr/>
+                    <a:lstStyle/>
+                    <a:p>
+                      <a:pPr algn="l" fontAlgn="b"/>
+                      <a:r>
+                        <a:rPr lang="en-US" sz="1600" b="0" u="none" strike="noStrike">
+                          <a:solidFill>
+                            <a:srgbClr val="000000"/>
+                          </a:solidFill>
+                          <a:effectLst/>
+                        </a:rPr>
+                        <a:t>    Male</a:t>
+                      </a:r>
+                      <a:endParaRPr lang="en-US" sz="1600" b="0" i="0" u="none" strike="noStrike">
+                        <a:solidFill>
+                          <a:srgbClr val="000000"/>
+                        </a:solidFill>
+                        <a:effectLst/>
+                        <a:latin typeface="Aptos Narrow" panose="020B0004020202020204" pitchFamily="34" charset="0"/>
+                      </a:endParaRPr>
+                    </a:p>
+                  </a:txBody>
+                  <a:tcPr marL="9525" marR="9525" marT="9525" marB="0" anchor="b"/>
+                </a:tc>
+                <a:tc>
+                  <a:txBody>
+                    <a:bodyPr/>
+                    <a:lstStyle/>
+                    <a:p>
+                      <a:pPr algn="l" fontAlgn="b"/>
+                      <a:r>
+                        <a:rPr lang="en-US" sz="1600" b="0" u="none" strike="noStrike">
+                          <a:solidFill>
+                            <a:srgbClr val="000000"/>
+                          </a:solidFill>
+                          <a:effectLst/>
+                        </a:rPr>
+                        <a:t>6 (15.79%)</a:t>
+                      </a:r>
+                      <a:endParaRPr lang="en-US" sz="1600" b="0" i="0" u="none" strike="noStrike">
+                        <a:solidFill>
+                          <a:srgbClr val="000000"/>
+                        </a:solidFill>
+                        <a:effectLst/>
+                        <a:latin typeface="Aptos Narrow" panose="020B0004020202020204" pitchFamily="34" charset="0"/>
+                      </a:endParaRPr>
+                    </a:p>
+                  </a:txBody>
+                  <a:tcPr marL="9525" marR="9525" marT="9525" marB="0" anchor="b"/>
+                </a:tc>
+                <a:tc>
+                  <a:txBody>
+                    <a:bodyPr/>
+                    <a:lstStyle/>
+                    <a:p>
+                      <a:pPr algn="l" fontAlgn="b"/>
+                      <a:r>
+                        <a:rPr lang="en-US" sz="1600" b="0" u="none" strike="noStrike">
+                          <a:solidFill>
+                            <a:srgbClr val="000000"/>
+                          </a:solidFill>
+                          <a:effectLst/>
+                        </a:rPr>
+                        <a:t>5 (38.46%)</a:t>
+                      </a:r>
+                      <a:endParaRPr lang="en-US" sz="1600" b="0" i="0" u="none" strike="noStrike">
+                        <a:solidFill>
+                          <a:srgbClr val="000000"/>
+                        </a:solidFill>
+                        <a:effectLst/>
+                        <a:latin typeface="Aptos Narrow" panose="020B0004020202020204" pitchFamily="34" charset="0"/>
+                      </a:endParaRPr>
+                    </a:p>
+                  </a:txBody>
+                  <a:tcPr marL="9525" marR="9525" marT="9525" marB="0" anchor="b"/>
+                </a:tc>
+                <a:extLst>
+                  <a:ext uri="{0D108BD9-81ED-4DB2-BD59-A6C34878D82A}">
+                    <a16:rowId xmlns:a16="http://schemas.microsoft.com/office/drawing/2014/main" val="1904711686"/>
+                  </a:ext>
+                </a:extLst>
+              </a:tr>
+              <a:tr h="234662">
+                <a:tc>
+                  <a:txBody>
+                    <a:bodyPr/>
+                    <a:lstStyle/>
+                    <a:p>
+                      <a:pPr algn="l" fontAlgn="b"/>
+                      <a:r>
+                        <a:rPr lang="en-US" sz="1600" b="0" u="none" strike="noStrike">
+                          <a:solidFill>
+                            <a:srgbClr val="000000"/>
+                          </a:solidFill>
+                          <a:effectLst/>
+                        </a:rPr>
+                        <a:t>    Female</a:t>
+                      </a:r>
+                      <a:endParaRPr lang="en-US" sz="1600" b="0" i="0" u="none" strike="noStrike">
+                        <a:solidFill>
+                          <a:srgbClr val="000000"/>
+                        </a:solidFill>
+                        <a:effectLst/>
+                        <a:latin typeface="Aptos Narrow" panose="020B0004020202020204" pitchFamily="34" charset="0"/>
+                      </a:endParaRPr>
+                    </a:p>
+                  </a:txBody>
+                  <a:tcPr marL="9525" marR="9525" marT="9525" marB="0" anchor="b"/>
+                </a:tc>
+                <a:tc>
+                  <a:txBody>
+                    <a:bodyPr/>
+                    <a:lstStyle/>
+                    <a:p>
+                      <a:pPr algn="l" fontAlgn="b"/>
+                      <a:r>
+                        <a:rPr lang="en-US" sz="1600" b="0" u="none" strike="noStrike">
+                          <a:solidFill>
+                            <a:srgbClr val="000000"/>
+                          </a:solidFill>
+                          <a:effectLst/>
+                        </a:rPr>
+                        <a:t>29 (76.32%)</a:t>
+                      </a:r>
+                      <a:endParaRPr lang="en-US" sz="1600" b="0" i="0" u="none" strike="noStrike">
+                        <a:solidFill>
+                          <a:srgbClr val="000000"/>
+                        </a:solidFill>
+                        <a:effectLst/>
+                        <a:latin typeface="Aptos Narrow" panose="020B0004020202020204" pitchFamily="34" charset="0"/>
+                      </a:endParaRPr>
+                    </a:p>
+                  </a:txBody>
+                  <a:tcPr marL="9525" marR="9525" marT="9525" marB="0" anchor="b"/>
+                </a:tc>
+                <a:tc>
+                  <a:txBody>
+                    <a:bodyPr/>
+                    <a:lstStyle/>
+                    <a:p>
+                      <a:pPr algn="l" fontAlgn="b"/>
+                      <a:r>
+                        <a:rPr lang="en-US" sz="1600" b="0" u="none" strike="noStrike">
+                          <a:solidFill>
+                            <a:srgbClr val="000000"/>
+                          </a:solidFill>
+                          <a:effectLst/>
+                        </a:rPr>
+                        <a:t>8 (61.54%)</a:t>
+                      </a:r>
+                      <a:endParaRPr lang="en-US" sz="1600" b="0" i="0" u="none" strike="noStrike">
+                        <a:solidFill>
+                          <a:srgbClr val="000000"/>
+                        </a:solidFill>
+                        <a:effectLst/>
+                        <a:latin typeface="Aptos Narrow" panose="020B0004020202020204" pitchFamily="34" charset="0"/>
+                      </a:endParaRPr>
+                    </a:p>
+                  </a:txBody>
+                  <a:tcPr marL="9525" marR="9525" marT="9525" marB="0" anchor="b"/>
+                </a:tc>
+                <a:extLst>
+                  <a:ext uri="{0D108BD9-81ED-4DB2-BD59-A6C34878D82A}">
+                    <a16:rowId xmlns:a16="http://schemas.microsoft.com/office/drawing/2014/main" val="4100046887"/>
+                  </a:ext>
+                </a:extLst>
+              </a:tr>
+              <a:tr h="234662">
+                <a:tc>
+                  <a:txBody>
+                    <a:bodyPr/>
+                    <a:lstStyle/>
+                    <a:p>
+                      <a:pPr algn="l" fontAlgn="b"/>
+                      <a:r>
+                        <a:rPr lang="en-US" sz="1600" b="0" u="none" strike="noStrike">
+                          <a:solidFill>
+                            <a:srgbClr val="000000"/>
+                          </a:solidFill>
+                          <a:effectLst/>
+                        </a:rPr>
+                        <a:t>    Transgender</a:t>
+                      </a:r>
+                      <a:endParaRPr lang="en-US" sz="1600" b="0" i="0" u="none" strike="noStrike">
+                        <a:solidFill>
+                          <a:srgbClr val="000000"/>
+                        </a:solidFill>
+                        <a:effectLst/>
+                        <a:latin typeface="Aptos Narrow" panose="020B0004020202020204" pitchFamily="34" charset="0"/>
+                      </a:endParaRPr>
+                    </a:p>
+                  </a:txBody>
+                  <a:tcPr marL="9525" marR="9525" marT="9525" marB="0" anchor="b"/>
+                </a:tc>
+                <a:tc>
+                  <a:txBody>
+                    <a:bodyPr/>
+                    <a:lstStyle/>
+                    <a:p>
+                      <a:pPr algn="l" fontAlgn="b"/>
+                      <a:r>
+                        <a:rPr lang="en-US" sz="1600" b="0" u="none" strike="noStrike">
+                          <a:solidFill>
+                            <a:srgbClr val="000000"/>
+                          </a:solidFill>
+                          <a:effectLst/>
+                        </a:rPr>
+                        <a:t>1 (2.63%)</a:t>
+                      </a:r>
+                      <a:endParaRPr lang="en-US" sz="1600" b="0" i="0" u="none" strike="noStrike">
+                        <a:solidFill>
+                          <a:srgbClr val="000000"/>
+                        </a:solidFill>
+                        <a:effectLst/>
+                        <a:latin typeface="Aptos Narrow" panose="020B0004020202020204" pitchFamily="34" charset="0"/>
+                      </a:endParaRPr>
+                    </a:p>
+                  </a:txBody>
+                  <a:tcPr marL="9525" marR="9525" marT="9525" marB="0" anchor="b"/>
+                </a:tc>
+                <a:tc>
+                  <a:txBody>
+                    <a:bodyPr/>
+                    <a:lstStyle/>
+                    <a:p>
+                      <a:pPr algn="l" fontAlgn="b"/>
+                      <a:r>
+                        <a:rPr lang="en-US" sz="1600" b="0" u="none" strike="noStrike">
+                          <a:solidFill>
+                            <a:srgbClr val="000000"/>
+                          </a:solidFill>
+                          <a:effectLst/>
+                        </a:rPr>
+                        <a:t>0 (0.00%)</a:t>
+                      </a:r>
+                      <a:endParaRPr lang="en-US" sz="1600" b="0" i="0" u="none" strike="noStrike">
+                        <a:solidFill>
+                          <a:srgbClr val="000000"/>
+                        </a:solidFill>
+                        <a:effectLst/>
+                        <a:latin typeface="Aptos Narrow" panose="020B0004020202020204" pitchFamily="34" charset="0"/>
+                      </a:endParaRPr>
+                    </a:p>
+                  </a:txBody>
+                  <a:tcPr marL="9525" marR="9525" marT="9525" marB="0" anchor="b"/>
+                </a:tc>
+                <a:extLst>
+                  <a:ext uri="{0D108BD9-81ED-4DB2-BD59-A6C34878D82A}">
+                    <a16:rowId xmlns:a16="http://schemas.microsoft.com/office/drawing/2014/main" val="2840837433"/>
+                  </a:ext>
+                </a:extLst>
+              </a:tr>
+              <a:tr h="234662">
+                <a:tc>
+                  <a:txBody>
+                    <a:bodyPr/>
+                    <a:lstStyle/>
+                    <a:p>
+                      <a:pPr algn="l" fontAlgn="b"/>
+                      <a:r>
+                        <a:rPr lang="en-US" sz="1600" b="0" u="none" strike="noStrike">
+                          <a:solidFill>
+                            <a:srgbClr val="000000"/>
+                          </a:solidFill>
+                          <a:effectLst/>
+                        </a:rPr>
+                        <a:t>    Other Gender</a:t>
+                      </a:r>
+                      <a:endParaRPr lang="en-US" sz="1600" b="0" i="0" u="none" strike="noStrike">
+                        <a:solidFill>
+                          <a:srgbClr val="000000"/>
+                        </a:solidFill>
+                        <a:effectLst/>
+                        <a:latin typeface="Aptos Narrow" panose="020B0004020202020204" pitchFamily="34" charset="0"/>
+                      </a:endParaRPr>
+                    </a:p>
+                  </a:txBody>
+                  <a:tcPr marL="9525" marR="9525" marT="9525" marB="0" anchor="b"/>
+                </a:tc>
+                <a:tc>
+                  <a:txBody>
+                    <a:bodyPr/>
+                    <a:lstStyle/>
+                    <a:p>
+                      <a:pPr algn="l" fontAlgn="b"/>
+                      <a:r>
+                        <a:rPr lang="en-US" sz="1600" b="0" u="none" strike="noStrike">
+                          <a:solidFill>
+                            <a:srgbClr val="000000"/>
+                          </a:solidFill>
+                          <a:effectLst/>
+                        </a:rPr>
+                        <a:t>1 (2.63%)</a:t>
+                      </a:r>
+                      <a:endParaRPr lang="en-US" sz="1600" b="0" i="0" u="none" strike="noStrike">
+                        <a:solidFill>
+                          <a:srgbClr val="000000"/>
+                        </a:solidFill>
+                        <a:effectLst/>
+                        <a:latin typeface="Aptos Narrow" panose="020B0004020202020204" pitchFamily="34" charset="0"/>
+                      </a:endParaRPr>
+                    </a:p>
+                  </a:txBody>
+                  <a:tcPr marL="9525" marR="9525" marT="9525" marB="0" anchor="b"/>
+                </a:tc>
+                <a:tc>
+                  <a:txBody>
+                    <a:bodyPr/>
+                    <a:lstStyle/>
+                    <a:p>
+                      <a:pPr algn="l" fontAlgn="b"/>
+                      <a:r>
+                        <a:rPr lang="en-US" sz="1600" b="0" u="none" strike="noStrike">
+                          <a:solidFill>
+                            <a:srgbClr val="000000"/>
+                          </a:solidFill>
+                          <a:effectLst/>
+                        </a:rPr>
+                        <a:t>0 (0.00%)</a:t>
+                      </a:r>
+                      <a:endParaRPr lang="en-US" sz="1600" b="0" i="0" u="none" strike="noStrike">
+                        <a:solidFill>
+                          <a:srgbClr val="000000"/>
+                        </a:solidFill>
+                        <a:effectLst/>
+                        <a:latin typeface="Aptos Narrow" panose="020B0004020202020204" pitchFamily="34" charset="0"/>
+                      </a:endParaRPr>
+                    </a:p>
+                  </a:txBody>
+                  <a:tcPr marL="9525" marR="9525" marT="9525" marB="0" anchor="b"/>
+                </a:tc>
+                <a:extLst>
+                  <a:ext uri="{0D108BD9-81ED-4DB2-BD59-A6C34878D82A}">
+                    <a16:rowId xmlns:a16="http://schemas.microsoft.com/office/drawing/2014/main" val="3587293760"/>
+                  </a:ext>
+                </a:extLst>
+              </a:tr>
+              <a:tr h="234662">
+                <a:tc>
+                  <a:txBody>
+                    <a:bodyPr/>
+                    <a:lstStyle/>
+                    <a:p>
+                      <a:pPr algn="l" fontAlgn="b"/>
+                      <a:r>
+                        <a:rPr lang="en-US" sz="1600" b="0" u="none" strike="noStrike">
+                          <a:solidFill>
+                            <a:srgbClr val="000000"/>
+                          </a:solidFill>
+                          <a:effectLst/>
+                        </a:rPr>
+                        <a:t>    Prefer Not to Answer</a:t>
+                      </a:r>
+                      <a:endParaRPr lang="en-US" sz="1600" b="0" i="0" u="none" strike="noStrike">
+                        <a:solidFill>
+                          <a:srgbClr val="000000"/>
+                        </a:solidFill>
+                        <a:effectLst/>
+                        <a:latin typeface="Aptos Narrow" panose="020B0004020202020204" pitchFamily="34" charset="0"/>
+                      </a:endParaRPr>
+                    </a:p>
+                  </a:txBody>
+                  <a:tcPr marL="9525" marR="9525" marT="9525" marB="0" anchor="b"/>
+                </a:tc>
+                <a:tc>
+                  <a:txBody>
+                    <a:bodyPr/>
+                    <a:lstStyle/>
+                    <a:p>
+                      <a:pPr algn="l" fontAlgn="b"/>
+                      <a:r>
+                        <a:rPr lang="en-US" sz="1600" b="0" u="none" strike="noStrike">
+                          <a:solidFill>
+                            <a:srgbClr val="000000"/>
+                          </a:solidFill>
+                          <a:effectLst/>
+                        </a:rPr>
+                        <a:t>1 (2.63%)</a:t>
+                      </a:r>
+                      <a:endParaRPr lang="en-US" sz="1600" b="0" i="0" u="none" strike="noStrike">
+                        <a:solidFill>
+                          <a:srgbClr val="000000"/>
+                        </a:solidFill>
+                        <a:effectLst/>
+                        <a:latin typeface="Aptos Narrow" panose="020B0004020202020204" pitchFamily="34" charset="0"/>
+                      </a:endParaRPr>
+                    </a:p>
+                  </a:txBody>
+                  <a:tcPr marL="9525" marR="9525" marT="9525" marB="0" anchor="b"/>
+                </a:tc>
+                <a:tc>
+                  <a:txBody>
+                    <a:bodyPr/>
+                    <a:lstStyle/>
+                    <a:p>
+                      <a:pPr algn="l" fontAlgn="b"/>
+                      <a:r>
+                        <a:rPr lang="en-US" sz="1600" b="0" u="none" strike="noStrike">
+                          <a:solidFill>
+                            <a:srgbClr val="000000"/>
+                          </a:solidFill>
+                          <a:effectLst/>
+                        </a:rPr>
+                        <a:t>0 (0.00%)</a:t>
+                      </a:r>
+                      <a:endParaRPr lang="en-US" sz="1600" b="0" i="0" u="none" strike="noStrike">
+                        <a:solidFill>
+                          <a:srgbClr val="000000"/>
+                        </a:solidFill>
+                        <a:effectLst/>
+                        <a:latin typeface="Aptos Narrow" panose="020B0004020202020204" pitchFamily="34" charset="0"/>
+                      </a:endParaRPr>
+                    </a:p>
+                  </a:txBody>
+                  <a:tcPr marL="9525" marR="9525" marT="9525" marB="0" anchor="b"/>
+                </a:tc>
+                <a:extLst>
+                  <a:ext uri="{0D108BD9-81ED-4DB2-BD59-A6C34878D82A}">
+                    <a16:rowId xmlns:a16="http://schemas.microsoft.com/office/drawing/2014/main" val="1972294756"/>
+                  </a:ext>
+                </a:extLst>
+              </a:tr>
+              <a:tr h="234662">
+                <a:tc>
+                  <a:txBody>
+                    <a:bodyPr/>
+                    <a:lstStyle/>
+                    <a:p>
+                      <a:pPr algn="l" fontAlgn="b"/>
+                      <a:r>
+                        <a:rPr lang="en-US" sz="1600" b="0" u="none" strike="noStrike">
+                          <a:solidFill>
+                            <a:srgbClr val="000000"/>
+                          </a:solidFill>
+                          <a:effectLst/>
+                        </a:rPr>
+                        <a:t>Race</a:t>
+                      </a:r>
+                      <a:endParaRPr lang="en-US" sz="1600" b="0" i="0" u="none" strike="noStrike">
+                        <a:solidFill>
+                          <a:srgbClr val="000000"/>
+                        </a:solidFill>
+                        <a:effectLst/>
+                        <a:latin typeface="Aptos Narrow" panose="020B0004020202020204" pitchFamily="34" charset="0"/>
+                      </a:endParaRPr>
+                    </a:p>
+                  </a:txBody>
+                  <a:tcPr marL="9525" marR="9525" marT="9525" marB="0" anchor="b"/>
+                </a:tc>
+                <a:tc>
+                  <a:txBody>
+                    <a:bodyPr/>
+                    <a:lstStyle/>
+                    <a:p>
+                      <a:pPr algn="l" fontAlgn="b"/>
+                      <a:endParaRPr lang="en-US" sz="1600" b="0" i="0" u="none" strike="noStrike" dirty="0">
+                        <a:solidFill>
+                          <a:srgbClr val="000000"/>
+                        </a:solidFill>
+                        <a:effectLst/>
+                        <a:latin typeface="Aptos Narrow" panose="020B0004020202020204" pitchFamily="34" charset="0"/>
+                      </a:endParaRPr>
+                    </a:p>
+                  </a:txBody>
+                  <a:tcPr marL="9525" marR="9525" marT="9525" marB="0" anchor="b"/>
+                </a:tc>
+                <a:tc>
+                  <a:txBody>
+                    <a:bodyPr/>
+                    <a:lstStyle/>
+                    <a:p>
+                      <a:pPr algn="l" fontAlgn="b"/>
+                      <a:endParaRPr lang="en-US" sz="1600" b="0" i="0" u="none" strike="noStrike">
+                        <a:solidFill>
+                          <a:srgbClr val="000000"/>
+                        </a:solidFill>
+                        <a:effectLst/>
+                        <a:latin typeface="Aptos Narrow" panose="020B0004020202020204" pitchFamily="34" charset="0"/>
+                      </a:endParaRPr>
+                    </a:p>
+                  </a:txBody>
+                  <a:tcPr marL="9525" marR="9525" marT="9525" marB="0" anchor="b"/>
+                </a:tc>
+                <a:extLst>
+                  <a:ext uri="{0D108BD9-81ED-4DB2-BD59-A6C34878D82A}">
+                    <a16:rowId xmlns:a16="http://schemas.microsoft.com/office/drawing/2014/main" val="672095085"/>
+                  </a:ext>
+                </a:extLst>
+              </a:tr>
+              <a:tr h="234662">
+                <a:tc>
+                  <a:txBody>
+                    <a:bodyPr/>
+                    <a:lstStyle/>
+                    <a:p>
+                      <a:pPr algn="l" fontAlgn="b"/>
+                      <a:r>
+                        <a:rPr lang="en-US" sz="1600" b="0" u="none" strike="noStrike">
+                          <a:solidFill>
+                            <a:srgbClr val="000000"/>
+                          </a:solidFill>
+                          <a:effectLst/>
+                        </a:rPr>
+                        <a:t>    White</a:t>
+                      </a:r>
+                      <a:endParaRPr lang="en-US" sz="1600" b="0" i="0" u="none" strike="noStrike">
+                        <a:solidFill>
+                          <a:srgbClr val="000000"/>
+                        </a:solidFill>
+                        <a:effectLst/>
+                        <a:latin typeface="Aptos Narrow" panose="020B0004020202020204" pitchFamily="34" charset="0"/>
+                      </a:endParaRPr>
+                    </a:p>
+                  </a:txBody>
+                  <a:tcPr marL="9525" marR="9525" marT="9525" marB="0" anchor="b"/>
+                </a:tc>
+                <a:tc>
+                  <a:txBody>
+                    <a:bodyPr/>
+                    <a:lstStyle/>
+                    <a:p>
+                      <a:pPr algn="l" fontAlgn="b"/>
+                      <a:r>
+                        <a:rPr lang="en-US" sz="1600" b="0" u="none" strike="noStrike">
+                          <a:solidFill>
+                            <a:srgbClr val="000000"/>
+                          </a:solidFill>
+                          <a:effectLst/>
+                        </a:rPr>
+                        <a:t>22 (57.89%)</a:t>
+                      </a:r>
+                      <a:endParaRPr lang="en-US" sz="1600" b="0" i="0" u="none" strike="noStrike">
+                        <a:solidFill>
+                          <a:srgbClr val="000000"/>
+                        </a:solidFill>
+                        <a:effectLst/>
+                        <a:latin typeface="Aptos Narrow" panose="020B0004020202020204" pitchFamily="34" charset="0"/>
+                      </a:endParaRPr>
+                    </a:p>
+                  </a:txBody>
+                  <a:tcPr marL="9525" marR="9525" marT="9525" marB="0" anchor="b"/>
+                </a:tc>
+                <a:tc>
+                  <a:txBody>
+                    <a:bodyPr/>
+                    <a:lstStyle/>
+                    <a:p>
+                      <a:pPr algn="l" fontAlgn="b"/>
+                      <a:r>
+                        <a:rPr lang="en-US" sz="1600" b="0" u="none" strike="noStrike">
+                          <a:solidFill>
+                            <a:srgbClr val="000000"/>
+                          </a:solidFill>
+                          <a:effectLst/>
+                        </a:rPr>
+                        <a:t>4 (30.77%)</a:t>
+                      </a:r>
+                      <a:endParaRPr lang="en-US" sz="1600" b="0" i="0" u="none" strike="noStrike">
+                        <a:solidFill>
+                          <a:srgbClr val="000000"/>
+                        </a:solidFill>
+                        <a:effectLst/>
+                        <a:latin typeface="Aptos Narrow" panose="020B0004020202020204" pitchFamily="34" charset="0"/>
+                      </a:endParaRPr>
+                    </a:p>
+                  </a:txBody>
+                  <a:tcPr marL="9525" marR="9525" marT="9525" marB="0" anchor="b"/>
+                </a:tc>
+                <a:extLst>
+                  <a:ext uri="{0D108BD9-81ED-4DB2-BD59-A6C34878D82A}">
+                    <a16:rowId xmlns:a16="http://schemas.microsoft.com/office/drawing/2014/main" val="2060157034"/>
+                  </a:ext>
+                </a:extLst>
+              </a:tr>
+              <a:tr h="234662">
+                <a:tc>
+                  <a:txBody>
+                    <a:bodyPr/>
+                    <a:lstStyle/>
+                    <a:p>
+                      <a:pPr algn="l" fontAlgn="b"/>
+                      <a:r>
+                        <a:rPr lang="en-US" sz="1600" b="0" u="none" strike="noStrike">
+                          <a:solidFill>
+                            <a:srgbClr val="000000"/>
+                          </a:solidFill>
+                          <a:effectLst/>
+                        </a:rPr>
+                        <a:t>    Black</a:t>
+                      </a:r>
+                      <a:endParaRPr lang="en-US" sz="1600" b="0" i="0" u="none" strike="noStrike">
+                        <a:solidFill>
+                          <a:srgbClr val="000000"/>
+                        </a:solidFill>
+                        <a:effectLst/>
+                        <a:latin typeface="Aptos Narrow" panose="020B0004020202020204" pitchFamily="34" charset="0"/>
+                      </a:endParaRPr>
+                    </a:p>
+                  </a:txBody>
+                  <a:tcPr marL="9525" marR="9525" marT="9525" marB="0" anchor="b"/>
+                </a:tc>
+                <a:tc>
+                  <a:txBody>
+                    <a:bodyPr/>
+                    <a:lstStyle/>
+                    <a:p>
+                      <a:pPr algn="l" fontAlgn="b"/>
+                      <a:r>
+                        <a:rPr lang="en-US" sz="1600" b="0" u="none" strike="noStrike">
+                          <a:solidFill>
+                            <a:srgbClr val="000000"/>
+                          </a:solidFill>
+                          <a:effectLst/>
+                        </a:rPr>
+                        <a:t>1 (2.63%)</a:t>
+                      </a:r>
+                      <a:endParaRPr lang="en-US" sz="1600" b="0" i="0" u="none" strike="noStrike">
+                        <a:solidFill>
+                          <a:srgbClr val="000000"/>
+                        </a:solidFill>
+                        <a:effectLst/>
+                        <a:latin typeface="Aptos Narrow" panose="020B0004020202020204" pitchFamily="34" charset="0"/>
+                      </a:endParaRPr>
+                    </a:p>
+                  </a:txBody>
+                  <a:tcPr marL="9525" marR="9525" marT="9525" marB="0" anchor="b"/>
+                </a:tc>
+                <a:tc>
+                  <a:txBody>
+                    <a:bodyPr/>
+                    <a:lstStyle/>
+                    <a:p>
+                      <a:pPr algn="l" fontAlgn="b"/>
+                      <a:r>
+                        <a:rPr lang="en-US" sz="1600" b="0" u="none" strike="noStrike">
+                          <a:solidFill>
+                            <a:srgbClr val="000000"/>
+                          </a:solidFill>
+                          <a:effectLst/>
+                        </a:rPr>
+                        <a:t>0 (0.00%)</a:t>
+                      </a:r>
+                      <a:endParaRPr lang="en-US" sz="1600" b="0" i="0" u="none" strike="noStrike">
+                        <a:solidFill>
+                          <a:srgbClr val="000000"/>
+                        </a:solidFill>
+                        <a:effectLst/>
+                        <a:latin typeface="Aptos Narrow" panose="020B0004020202020204" pitchFamily="34" charset="0"/>
+                      </a:endParaRPr>
+                    </a:p>
+                  </a:txBody>
+                  <a:tcPr marL="9525" marR="9525" marT="9525" marB="0" anchor="b"/>
+                </a:tc>
+                <a:extLst>
+                  <a:ext uri="{0D108BD9-81ED-4DB2-BD59-A6C34878D82A}">
+                    <a16:rowId xmlns:a16="http://schemas.microsoft.com/office/drawing/2014/main" val="780633649"/>
+                  </a:ext>
+                </a:extLst>
+              </a:tr>
+              <a:tr h="234662">
+                <a:tc>
+                  <a:txBody>
+                    <a:bodyPr/>
+                    <a:lstStyle/>
+                    <a:p>
+                      <a:pPr algn="l" fontAlgn="b"/>
+                      <a:r>
+                        <a:rPr lang="en-US" sz="1600" b="0" u="none" strike="noStrike">
+                          <a:solidFill>
+                            <a:srgbClr val="000000"/>
+                          </a:solidFill>
+                          <a:effectLst/>
+                        </a:rPr>
+                        <a:t>    Asian</a:t>
+                      </a:r>
+                      <a:endParaRPr lang="en-US" sz="1600" b="0" i="0" u="none" strike="noStrike">
+                        <a:solidFill>
+                          <a:srgbClr val="000000"/>
+                        </a:solidFill>
+                        <a:effectLst/>
+                        <a:latin typeface="Aptos Narrow" panose="020B0004020202020204" pitchFamily="34" charset="0"/>
+                      </a:endParaRPr>
+                    </a:p>
+                  </a:txBody>
+                  <a:tcPr marL="9525" marR="9525" marT="9525" marB="0" anchor="b"/>
+                </a:tc>
+                <a:tc>
+                  <a:txBody>
+                    <a:bodyPr/>
+                    <a:lstStyle/>
+                    <a:p>
+                      <a:pPr algn="l" fontAlgn="b"/>
+                      <a:r>
+                        <a:rPr lang="en-US" sz="1600" b="0" u="none" strike="noStrike" dirty="0">
+                          <a:solidFill>
+                            <a:srgbClr val="000000"/>
+                          </a:solidFill>
+                          <a:effectLst/>
+                        </a:rPr>
+                        <a:t>2 (5.26%)</a:t>
+                      </a:r>
+                      <a:endParaRPr lang="en-US" sz="1600" b="0" i="0" u="none" strike="noStrike" dirty="0">
+                        <a:solidFill>
+                          <a:srgbClr val="000000"/>
+                        </a:solidFill>
+                        <a:effectLst/>
+                        <a:latin typeface="Aptos Narrow" panose="020B0004020202020204" pitchFamily="34" charset="0"/>
+                      </a:endParaRPr>
+                    </a:p>
+                  </a:txBody>
+                  <a:tcPr marL="9525" marR="9525" marT="9525" marB="0" anchor="b"/>
+                </a:tc>
+                <a:tc>
+                  <a:txBody>
+                    <a:bodyPr/>
+                    <a:lstStyle/>
+                    <a:p>
+                      <a:pPr algn="l" fontAlgn="b"/>
+                      <a:r>
+                        <a:rPr lang="en-US" sz="1600" b="0" u="none" strike="noStrike">
+                          <a:solidFill>
+                            <a:srgbClr val="000000"/>
+                          </a:solidFill>
+                          <a:effectLst/>
+                        </a:rPr>
+                        <a:t>0 (0.00%)</a:t>
+                      </a:r>
+                      <a:endParaRPr lang="en-US" sz="1600" b="0" i="0" u="none" strike="noStrike">
+                        <a:solidFill>
+                          <a:srgbClr val="000000"/>
+                        </a:solidFill>
+                        <a:effectLst/>
+                        <a:latin typeface="Aptos Narrow" panose="020B0004020202020204" pitchFamily="34" charset="0"/>
+                      </a:endParaRPr>
+                    </a:p>
+                  </a:txBody>
+                  <a:tcPr marL="9525" marR="9525" marT="9525" marB="0" anchor="b"/>
+                </a:tc>
+                <a:extLst>
+                  <a:ext uri="{0D108BD9-81ED-4DB2-BD59-A6C34878D82A}">
+                    <a16:rowId xmlns:a16="http://schemas.microsoft.com/office/drawing/2014/main" val="2149520935"/>
+                  </a:ext>
+                </a:extLst>
+              </a:tr>
+              <a:tr h="234662">
+                <a:tc>
+                  <a:txBody>
+                    <a:bodyPr/>
+                    <a:lstStyle/>
+                    <a:p>
+                      <a:pPr algn="l" fontAlgn="b"/>
+                      <a:r>
+                        <a:rPr lang="en-US" sz="1600" b="0" u="none" strike="noStrike">
+                          <a:solidFill>
+                            <a:srgbClr val="000000"/>
+                          </a:solidFill>
+                          <a:effectLst/>
+                        </a:rPr>
+                        <a:t>    Native American</a:t>
+                      </a:r>
+                      <a:endParaRPr lang="en-US" sz="1600" b="0" i="0" u="none" strike="noStrike">
+                        <a:solidFill>
+                          <a:srgbClr val="000000"/>
+                        </a:solidFill>
+                        <a:effectLst/>
+                        <a:latin typeface="Aptos Narrow" panose="020B0004020202020204" pitchFamily="34" charset="0"/>
+                      </a:endParaRPr>
+                    </a:p>
+                  </a:txBody>
+                  <a:tcPr marL="9525" marR="9525" marT="9525" marB="0" anchor="b"/>
+                </a:tc>
+                <a:tc>
+                  <a:txBody>
+                    <a:bodyPr/>
+                    <a:lstStyle/>
+                    <a:p>
+                      <a:pPr algn="l" fontAlgn="b"/>
+                      <a:r>
+                        <a:rPr lang="en-US" sz="1600" b="0" u="none" strike="noStrike">
+                          <a:solidFill>
+                            <a:srgbClr val="000000"/>
+                          </a:solidFill>
+                          <a:effectLst/>
+                        </a:rPr>
+                        <a:t>1 (2.63%)</a:t>
+                      </a:r>
+                      <a:endParaRPr lang="en-US" sz="1600" b="0" i="0" u="none" strike="noStrike">
+                        <a:solidFill>
+                          <a:srgbClr val="000000"/>
+                        </a:solidFill>
+                        <a:effectLst/>
+                        <a:latin typeface="Aptos Narrow" panose="020B0004020202020204" pitchFamily="34" charset="0"/>
+                      </a:endParaRPr>
+                    </a:p>
+                  </a:txBody>
+                  <a:tcPr marL="9525" marR="9525" marT="9525" marB="0" anchor="b"/>
+                </a:tc>
+                <a:tc>
+                  <a:txBody>
+                    <a:bodyPr/>
+                    <a:lstStyle/>
+                    <a:p>
+                      <a:pPr algn="l" fontAlgn="b"/>
+                      <a:r>
+                        <a:rPr lang="en-US" sz="1600" b="0" u="none" strike="noStrike">
+                          <a:solidFill>
+                            <a:srgbClr val="000000"/>
+                          </a:solidFill>
+                          <a:effectLst/>
+                        </a:rPr>
+                        <a:t>2 (15.38%)</a:t>
+                      </a:r>
+                      <a:endParaRPr lang="en-US" sz="1600" b="0" i="0" u="none" strike="noStrike">
+                        <a:solidFill>
+                          <a:srgbClr val="000000"/>
+                        </a:solidFill>
+                        <a:effectLst/>
+                        <a:latin typeface="Aptos Narrow" panose="020B0004020202020204" pitchFamily="34" charset="0"/>
+                      </a:endParaRPr>
+                    </a:p>
+                  </a:txBody>
+                  <a:tcPr marL="9525" marR="9525" marT="9525" marB="0" anchor="b"/>
+                </a:tc>
+                <a:extLst>
+                  <a:ext uri="{0D108BD9-81ED-4DB2-BD59-A6C34878D82A}">
+                    <a16:rowId xmlns:a16="http://schemas.microsoft.com/office/drawing/2014/main" val="4286264180"/>
+                  </a:ext>
+                </a:extLst>
+              </a:tr>
+              <a:tr h="234662">
+                <a:tc>
+                  <a:txBody>
+                    <a:bodyPr/>
+                    <a:lstStyle/>
+                    <a:p>
+                      <a:pPr algn="l" fontAlgn="b"/>
+                      <a:r>
+                        <a:rPr lang="en-US" sz="1600" b="0" u="none" strike="noStrike">
+                          <a:solidFill>
+                            <a:srgbClr val="000000"/>
+                          </a:solidFill>
+                          <a:effectLst/>
+                        </a:rPr>
+                        <a:t>    Pacific Islander</a:t>
+                      </a:r>
+                      <a:endParaRPr lang="en-US" sz="1600" b="0" i="0" u="none" strike="noStrike">
+                        <a:solidFill>
+                          <a:srgbClr val="000000"/>
+                        </a:solidFill>
+                        <a:effectLst/>
+                        <a:latin typeface="Aptos Narrow" panose="020B0004020202020204" pitchFamily="34" charset="0"/>
+                      </a:endParaRPr>
+                    </a:p>
+                  </a:txBody>
+                  <a:tcPr marL="9525" marR="9525" marT="9525" marB="0" anchor="b"/>
+                </a:tc>
+                <a:tc>
+                  <a:txBody>
+                    <a:bodyPr/>
+                    <a:lstStyle/>
+                    <a:p>
+                      <a:pPr algn="l" fontAlgn="b"/>
+                      <a:r>
+                        <a:rPr lang="en-US" sz="1600" b="0" u="none" strike="noStrike">
+                          <a:solidFill>
+                            <a:srgbClr val="000000"/>
+                          </a:solidFill>
+                          <a:effectLst/>
+                        </a:rPr>
+                        <a:t>2 (5.26%)</a:t>
+                      </a:r>
+                      <a:endParaRPr lang="en-US" sz="1600" b="0" i="0" u="none" strike="noStrike">
+                        <a:solidFill>
+                          <a:srgbClr val="000000"/>
+                        </a:solidFill>
+                        <a:effectLst/>
+                        <a:latin typeface="Aptos Narrow" panose="020B0004020202020204" pitchFamily="34" charset="0"/>
+                      </a:endParaRPr>
+                    </a:p>
+                  </a:txBody>
+                  <a:tcPr marL="9525" marR="9525" marT="9525" marB="0" anchor="b"/>
+                </a:tc>
+                <a:tc>
+                  <a:txBody>
+                    <a:bodyPr/>
+                    <a:lstStyle/>
+                    <a:p>
+                      <a:pPr algn="l" fontAlgn="b"/>
+                      <a:r>
+                        <a:rPr lang="en-US" sz="1600" b="0" u="none" strike="noStrike">
+                          <a:solidFill>
+                            <a:srgbClr val="000000"/>
+                          </a:solidFill>
+                          <a:effectLst/>
+                        </a:rPr>
+                        <a:t>0 (0.00%)</a:t>
+                      </a:r>
+                      <a:endParaRPr lang="en-US" sz="1600" b="0" i="0" u="none" strike="noStrike">
+                        <a:solidFill>
+                          <a:srgbClr val="000000"/>
+                        </a:solidFill>
+                        <a:effectLst/>
+                        <a:latin typeface="Aptos Narrow" panose="020B0004020202020204" pitchFamily="34" charset="0"/>
+                      </a:endParaRPr>
+                    </a:p>
+                  </a:txBody>
+                  <a:tcPr marL="9525" marR="9525" marT="9525" marB="0" anchor="b"/>
+                </a:tc>
+                <a:extLst>
+                  <a:ext uri="{0D108BD9-81ED-4DB2-BD59-A6C34878D82A}">
+                    <a16:rowId xmlns:a16="http://schemas.microsoft.com/office/drawing/2014/main" val="194996719"/>
+                  </a:ext>
+                </a:extLst>
+              </a:tr>
+              <a:tr h="234662">
+                <a:tc>
+                  <a:txBody>
+                    <a:bodyPr/>
+                    <a:lstStyle/>
+                    <a:p>
+                      <a:pPr algn="l" fontAlgn="b"/>
+                      <a:r>
+                        <a:rPr lang="en-US" sz="1600" b="0" u="none" strike="noStrike">
+                          <a:solidFill>
+                            <a:srgbClr val="000000"/>
+                          </a:solidFill>
+                          <a:effectLst/>
+                        </a:rPr>
+                        <a:t>    More Than One Race</a:t>
+                      </a:r>
+                      <a:endParaRPr lang="en-US" sz="1600" b="0" i="0" u="none" strike="noStrike">
+                        <a:solidFill>
+                          <a:srgbClr val="000000"/>
+                        </a:solidFill>
+                        <a:effectLst/>
+                        <a:latin typeface="Aptos Narrow" panose="020B0004020202020204" pitchFamily="34" charset="0"/>
+                      </a:endParaRPr>
+                    </a:p>
+                  </a:txBody>
+                  <a:tcPr marL="9525" marR="9525" marT="9525" marB="0" anchor="b"/>
+                </a:tc>
+                <a:tc>
+                  <a:txBody>
+                    <a:bodyPr/>
+                    <a:lstStyle/>
+                    <a:p>
+                      <a:pPr algn="l" fontAlgn="b"/>
+                      <a:r>
+                        <a:rPr lang="en-US" sz="1600" b="0" u="none" strike="noStrike">
+                          <a:solidFill>
+                            <a:srgbClr val="000000"/>
+                          </a:solidFill>
+                          <a:effectLst/>
+                        </a:rPr>
+                        <a:t>2 (5.26%)</a:t>
+                      </a:r>
+                      <a:endParaRPr lang="en-US" sz="1600" b="0" i="0" u="none" strike="noStrike">
+                        <a:solidFill>
+                          <a:srgbClr val="000000"/>
+                        </a:solidFill>
+                        <a:effectLst/>
+                        <a:latin typeface="Aptos Narrow" panose="020B0004020202020204" pitchFamily="34" charset="0"/>
+                      </a:endParaRPr>
+                    </a:p>
+                  </a:txBody>
+                  <a:tcPr marL="9525" marR="9525" marT="9525" marB="0" anchor="b"/>
+                </a:tc>
+                <a:tc>
+                  <a:txBody>
+                    <a:bodyPr/>
+                    <a:lstStyle/>
+                    <a:p>
+                      <a:pPr algn="l" fontAlgn="b"/>
+                      <a:r>
+                        <a:rPr lang="en-US" sz="1600" b="0" u="none" strike="noStrike">
+                          <a:solidFill>
+                            <a:srgbClr val="000000"/>
+                          </a:solidFill>
+                          <a:effectLst/>
+                        </a:rPr>
+                        <a:t>2 (15.38%)</a:t>
+                      </a:r>
+                      <a:endParaRPr lang="en-US" sz="1600" b="0" i="0" u="none" strike="noStrike">
+                        <a:solidFill>
+                          <a:srgbClr val="000000"/>
+                        </a:solidFill>
+                        <a:effectLst/>
+                        <a:latin typeface="Aptos Narrow" panose="020B0004020202020204" pitchFamily="34" charset="0"/>
+                      </a:endParaRPr>
+                    </a:p>
+                  </a:txBody>
+                  <a:tcPr marL="9525" marR="9525" marT="9525" marB="0" anchor="b"/>
+                </a:tc>
+                <a:extLst>
+                  <a:ext uri="{0D108BD9-81ED-4DB2-BD59-A6C34878D82A}">
+                    <a16:rowId xmlns:a16="http://schemas.microsoft.com/office/drawing/2014/main" val="1391546201"/>
+                  </a:ext>
+                </a:extLst>
+              </a:tr>
+              <a:tr h="234662">
+                <a:tc>
+                  <a:txBody>
+                    <a:bodyPr/>
+                    <a:lstStyle/>
+                    <a:p>
+                      <a:pPr algn="l" fontAlgn="b"/>
+                      <a:r>
+                        <a:rPr lang="en-US" sz="1600" b="0" u="none" strike="noStrike">
+                          <a:solidFill>
+                            <a:srgbClr val="000000"/>
+                          </a:solidFill>
+                          <a:effectLst/>
+                        </a:rPr>
+                        <a:t>    Other Race</a:t>
+                      </a:r>
+                      <a:endParaRPr lang="en-US" sz="1600" b="0" i="0" u="none" strike="noStrike">
+                        <a:solidFill>
+                          <a:srgbClr val="000000"/>
+                        </a:solidFill>
+                        <a:effectLst/>
+                        <a:latin typeface="Aptos Narrow" panose="020B0004020202020204" pitchFamily="34" charset="0"/>
+                      </a:endParaRPr>
+                    </a:p>
+                  </a:txBody>
+                  <a:tcPr marL="9525" marR="9525" marT="9525" marB="0" anchor="b"/>
+                </a:tc>
+                <a:tc>
+                  <a:txBody>
+                    <a:bodyPr/>
+                    <a:lstStyle/>
+                    <a:p>
+                      <a:pPr algn="l" fontAlgn="b"/>
+                      <a:r>
+                        <a:rPr lang="en-US" sz="1600" b="0" u="none" strike="noStrike">
+                          <a:solidFill>
+                            <a:srgbClr val="000000"/>
+                          </a:solidFill>
+                          <a:effectLst/>
+                        </a:rPr>
+                        <a:t>8 (21.05%)</a:t>
+                      </a:r>
+                      <a:endParaRPr lang="en-US" sz="1600" b="0" i="0" u="none" strike="noStrike">
+                        <a:solidFill>
+                          <a:srgbClr val="000000"/>
+                        </a:solidFill>
+                        <a:effectLst/>
+                        <a:latin typeface="Aptos Narrow" panose="020B0004020202020204" pitchFamily="34" charset="0"/>
+                      </a:endParaRPr>
+                    </a:p>
+                  </a:txBody>
+                  <a:tcPr marL="9525" marR="9525" marT="9525" marB="0" anchor="b"/>
+                </a:tc>
+                <a:tc>
+                  <a:txBody>
+                    <a:bodyPr/>
+                    <a:lstStyle/>
+                    <a:p>
+                      <a:pPr algn="l" fontAlgn="b"/>
+                      <a:r>
+                        <a:rPr lang="en-US" sz="1600" b="0" u="none" strike="noStrike">
+                          <a:solidFill>
+                            <a:srgbClr val="000000"/>
+                          </a:solidFill>
+                          <a:effectLst/>
+                        </a:rPr>
+                        <a:t>5 (38.46%)</a:t>
+                      </a:r>
+                      <a:endParaRPr lang="en-US" sz="1600" b="0" i="0" u="none" strike="noStrike">
+                        <a:solidFill>
+                          <a:srgbClr val="000000"/>
+                        </a:solidFill>
+                        <a:effectLst/>
+                        <a:latin typeface="Aptos Narrow" panose="020B0004020202020204" pitchFamily="34" charset="0"/>
+                      </a:endParaRPr>
+                    </a:p>
+                  </a:txBody>
+                  <a:tcPr marL="9525" marR="9525" marT="9525" marB="0" anchor="b"/>
+                </a:tc>
+                <a:extLst>
+                  <a:ext uri="{0D108BD9-81ED-4DB2-BD59-A6C34878D82A}">
+                    <a16:rowId xmlns:a16="http://schemas.microsoft.com/office/drawing/2014/main" val="2210548810"/>
+                  </a:ext>
+                </a:extLst>
+              </a:tr>
+              <a:tr h="234662">
+                <a:tc>
+                  <a:txBody>
+                    <a:bodyPr/>
+                    <a:lstStyle/>
+                    <a:p>
+                      <a:pPr algn="l" fontAlgn="b"/>
+                      <a:r>
+                        <a:rPr lang="en-US" sz="1600" b="0" u="none" strike="noStrike">
+                          <a:solidFill>
+                            <a:srgbClr val="000000"/>
+                          </a:solidFill>
+                          <a:effectLst/>
+                        </a:rPr>
+                        <a:t>    Hispanic/Latnix</a:t>
+                      </a:r>
+                      <a:endParaRPr lang="en-US" sz="1600" b="0" i="0" u="none" strike="noStrike">
+                        <a:solidFill>
+                          <a:srgbClr val="000000"/>
+                        </a:solidFill>
+                        <a:effectLst/>
+                        <a:latin typeface="Aptos Narrow" panose="020B0004020202020204" pitchFamily="34" charset="0"/>
+                      </a:endParaRPr>
+                    </a:p>
+                  </a:txBody>
+                  <a:tcPr marL="9525" marR="9525" marT="9525" marB="0" anchor="b"/>
+                </a:tc>
+                <a:tc>
+                  <a:txBody>
+                    <a:bodyPr/>
+                    <a:lstStyle/>
+                    <a:p>
+                      <a:pPr algn="l" fontAlgn="b"/>
+                      <a:r>
+                        <a:rPr lang="en-US" sz="1600" b="0" u="none" strike="noStrike">
+                          <a:solidFill>
+                            <a:srgbClr val="000000"/>
+                          </a:solidFill>
+                          <a:effectLst/>
+                        </a:rPr>
+                        <a:t>34 (89.47%)</a:t>
+                      </a:r>
+                      <a:endParaRPr lang="en-US" sz="1600" b="0" i="0" u="none" strike="noStrike">
+                        <a:solidFill>
+                          <a:srgbClr val="000000"/>
+                        </a:solidFill>
+                        <a:effectLst/>
+                        <a:latin typeface="Aptos Narrow" panose="020B0004020202020204" pitchFamily="34" charset="0"/>
+                      </a:endParaRPr>
+                    </a:p>
+                  </a:txBody>
+                  <a:tcPr marL="9525" marR="9525" marT="9525" marB="0" anchor="b"/>
+                </a:tc>
+                <a:tc>
+                  <a:txBody>
+                    <a:bodyPr/>
+                    <a:lstStyle/>
+                    <a:p>
+                      <a:pPr algn="l" fontAlgn="b"/>
+                      <a:r>
+                        <a:rPr lang="en-US" sz="1600" b="0" u="none" strike="noStrike">
+                          <a:solidFill>
+                            <a:srgbClr val="000000"/>
+                          </a:solidFill>
+                          <a:effectLst/>
+                        </a:rPr>
+                        <a:t>11 (84.62%)</a:t>
+                      </a:r>
+                      <a:endParaRPr lang="en-US" sz="1600" b="0" i="0" u="none" strike="noStrike">
+                        <a:solidFill>
+                          <a:srgbClr val="000000"/>
+                        </a:solidFill>
+                        <a:effectLst/>
+                        <a:latin typeface="Aptos Narrow" panose="020B0004020202020204" pitchFamily="34" charset="0"/>
+                      </a:endParaRPr>
+                    </a:p>
+                  </a:txBody>
+                  <a:tcPr marL="9525" marR="9525" marT="9525" marB="0" anchor="b"/>
+                </a:tc>
+                <a:extLst>
+                  <a:ext uri="{0D108BD9-81ED-4DB2-BD59-A6C34878D82A}">
+                    <a16:rowId xmlns:a16="http://schemas.microsoft.com/office/drawing/2014/main" val="2484789631"/>
+                  </a:ext>
+                </a:extLst>
+              </a:tr>
+              <a:tr h="234662">
+                <a:tc>
+                  <a:txBody>
+                    <a:bodyPr/>
+                    <a:lstStyle/>
+                    <a:p>
+                      <a:pPr algn="l" fontAlgn="b"/>
+                      <a:r>
+                        <a:rPr lang="en-US" sz="1600" b="0" u="none" strike="noStrike" dirty="0">
+                          <a:solidFill>
+                            <a:srgbClr val="000000"/>
+                          </a:solidFill>
+                          <a:effectLst/>
+                        </a:rPr>
+                        <a:t>    Non-Hispanic/Latinx</a:t>
+                      </a:r>
+                      <a:endParaRPr lang="en-US" sz="1600" b="0" i="0" u="none" strike="noStrike" dirty="0">
+                        <a:solidFill>
+                          <a:srgbClr val="000000"/>
+                        </a:solidFill>
+                        <a:effectLst/>
+                        <a:latin typeface="Aptos Narrow" panose="020B0004020202020204" pitchFamily="34" charset="0"/>
+                      </a:endParaRPr>
+                    </a:p>
+                  </a:txBody>
+                  <a:tcPr marL="9525" marR="9525" marT="9525" marB="0" anchor="b"/>
+                </a:tc>
+                <a:tc>
+                  <a:txBody>
+                    <a:bodyPr/>
+                    <a:lstStyle/>
+                    <a:p>
+                      <a:pPr algn="l" fontAlgn="b"/>
+                      <a:r>
+                        <a:rPr lang="en-US" sz="1600" b="0" u="none" strike="noStrike">
+                          <a:solidFill>
+                            <a:srgbClr val="000000"/>
+                          </a:solidFill>
+                          <a:effectLst/>
+                        </a:rPr>
+                        <a:t>4 (10.53%)</a:t>
+                      </a:r>
+                      <a:endParaRPr lang="en-US" sz="1600" b="0" i="0" u="none" strike="noStrike">
+                        <a:solidFill>
+                          <a:srgbClr val="000000"/>
+                        </a:solidFill>
+                        <a:effectLst/>
+                        <a:latin typeface="Aptos Narrow" panose="020B0004020202020204" pitchFamily="34" charset="0"/>
+                      </a:endParaRPr>
+                    </a:p>
+                  </a:txBody>
+                  <a:tcPr marL="9525" marR="9525" marT="9525" marB="0" anchor="b"/>
+                </a:tc>
+                <a:tc>
+                  <a:txBody>
+                    <a:bodyPr/>
+                    <a:lstStyle/>
+                    <a:p>
+                      <a:pPr algn="l" fontAlgn="b"/>
+                      <a:r>
+                        <a:rPr lang="en-US" sz="1600" b="0" u="none" strike="noStrike" dirty="0">
+                          <a:solidFill>
+                            <a:srgbClr val="000000"/>
+                          </a:solidFill>
+                          <a:effectLst/>
+                        </a:rPr>
+                        <a:t>2 (15.38%)</a:t>
+                      </a:r>
+                      <a:endParaRPr lang="en-US" sz="1600" b="0" i="0" u="none" strike="noStrike" dirty="0">
+                        <a:solidFill>
+                          <a:srgbClr val="000000"/>
+                        </a:solidFill>
+                        <a:effectLst/>
+                        <a:latin typeface="Aptos Narrow" panose="020B0004020202020204" pitchFamily="34" charset="0"/>
+                      </a:endParaRPr>
+                    </a:p>
+                  </a:txBody>
+                  <a:tcPr marL="9525" marR="9525" marT="9525" marB="0" anchor="b"/>
+                </a:tc>
+                <a:extLst>
+                  <a:ext uri="{0D108BD9-81ED-4DB2-BD59-A6C34878D82A}">
+                    <a16:rowId xmlns:a16="http://schemas.microsoft.com/office/drawing/2014/main" val="4002041963"/>
+                  </a:ext>
+                </a:extLst>
+              </a:tr>
+            </a:tbl>
+          </a:graphicData>
+        </a:graphic>
+      </p:graphicFrame>
+      <p:sp>
+        <p:nvSpPr>
+          <p:cNvPr id="7" name="TextBox 6">
+            <a:extLst>
+              <a:ext uri="{FF2B5EF4-FFF2-40B4-BE49-F238E27FC236}">
+                <a16:creationId xmlns:a16="http://schemas.microsoft.com/office/drawing/2014/main" id="{E386B83B-3DC3-D386-DEFD-E861C0B4A13D}"/>
+              </a:ext>
+            </a:extLst>
+          </p:cNvPr>
+          <p:cNvSpPr txBox="1"/>
           <p:nvPr/>
-        </p:nvPicPr>
-        <p:blipFill>
-          <a:blip r:embed="rId2"/>
-          <a:srcRect l="26556" r="22805"/>
-          <a:stretch/>
-        </p:blipFill>
+        </p:nvSpPr>
         <p:spPr>
           <a:xfrm>
-            <a:off x="1126435" y="304117"/>
-            <a:ext cx="3935896" cy="6249766"/>
+            <a:off x="1061832" y="1325563"/>
+            <a:ext cx="1528047" cy="369332"/>
           </a:xfrm>
           <a:prstGeom prst="rect">
             <a:avLst/>
           </a:prstGeom>
+          <a:noFill/>
         </p:spPr>
-      </p:pic>
-      <p:pic>
-        <p:nvPicPr>
-          <p:cNvPr id="5" name="Picture 4">
-            <a:extLst>
-              <a:ext uri="{FF2B5EF4-FFF2-40B4-BE49-F238E27FC236}">
-                <a16:creationId xmlns:a16="http://schemas.microsoft.com/office/drawing/2014/main" id="{E7EDFA29-841B-3FE7-69A5-7C4980F79832}"/>
-              </a:ext>
-            </a:extLst>
-          </p:cNvPr>
-          <p:cNvPicPr>
-            <a:picLocks noChangeAspect="1"/>
-          </p:cNvPicPr>
+        <p:txBody>
+          <a:bodyPr wrap="none" rtlCol="0">
+            <a:spAutoFit/>
+          </a:bodyPr>
+          <a:lstStyle/>
+          <a:p>
+            <a:r>
+              <a:rPr lang="en-US" dirty="0"/>
+              <a:t>Demographics</a:t>
+            </a:r>
+          </a:p>
+        </p:txBody>
+      </p:sp>
+      <p:graphicFrame>
+        <p:nvGraphicFramePr>
+          <p:cNvPr id="8" name="Table 7">
+            <a:extLst>
+              <a:ext uri="{FF2B5EF4-FFF2-40B4-BE49-F238E27FC236}">
+                <a16:creationId xmlns:a16="http://schemas.microsoft.com/office/drawing/2014/main" id="{1561D0A4-8885-CA9E-AF84-C22D1CB5E6F6}"/>
+              </a:ext>
+            </a:extLst>
+          </p:cNvPr>
+          <p:cNvGraphicFramePr>
+            <a:graphicFrameLocks noGrp="1"/>
+          </p:cNvGraphicFramePr>
+          <p:nvPr>
+            <p:extLst>
+              <p:ext uri="{D42A27DB-BD31-4B8C-83A1-F6EECF244321}">
+                <p14:modId xmlns:p14="http://schemas.microsoft.com/office/powerpoint/2010/main" val="2236882842"/>
+              </p:ext>
+            </p:extLst>
+          </p:nvPr>
+        </p:nvGraphicFramePr>
+        <p:xfrm>
+          <a:off x="6514547" y="1718478"/>
+          <a:ext cx="4835385" cy="2256702"/>
+        </p:xfrm>
+        <a:graphic>
+          <a:graphicData uri="http://schemas.openxmlformats.org/drawingml/2006/table">
+            <a:tbl>
+              <a:tblPr>
+                <a:tableStyleId>{8EC20E35-A176-4012-BC5E-935CFFF8708E}</a:tableStyleId>
+              </a:tblPr>
+              <a:tblGrid>
+                <a:gridCol w="2308753">
+                  <a:extLst>
+                    <a:ext uri="{9D8B030D-6E8A-4147-A177-3AD203B41FA5}">
+                      <a16:colId xmlns:a16="http://schemas.microsoft.com/office/drawing/2014/main" val="3436493381"/>
+                    </a:ext>
+                  </a:extLst>
+                </a:gridCol>
+                <a:gridCol w="1253760">
+                  <a:extLst>
+                    <a:ext uri="{9D8B030D-6E8A-4147-A177-3AD203B41FA5}">
+                      <a16:colId xmlns:a16="http://schemas.microsoft.com/office/drawing/2014/main" val="663273974"/>
+                    </a:ext>
+                  </a:extLst>
+                </a:gridCol>
+                <a:gridCol w="1272872">
+                  <a:extLst>
+                    <a:ext uri="{9D8B030D-6E8A-4147-A177-3AD203B41FA5}">
+                      <a16:colId xmlns:a16="http://schemas.microsoft.com/office/drawing/2014/main" val="375218474"/>
+                    </a:ext>
+                  </a:extLst>
+                </a:gridCol>
+              </a:tblGrid>
+              <a:tr h="376117">
+                <a:tc>
+                  <a:txBody>
+                    <a:bodyPr/>
+                    <a:lstStyle/>
+                    <a:p>
+                      <a:pPr algn="l" fontAlgn="b"/>
+                      <a:endParaRPr lang="en-US" sz="1600" b="0" i="0" u="none" strike="noStrike" dirty="0">
+                        <a:solidFill>
+                          <a:srgbClr val="000000"/>
+                        </a:solidFill>
+                        <a:effectLst/>
+                        <a:latin typeface="Aptos Narrow" panose="020B0004020202020204" pitchFamily="34" charset="0"/>
+                      </a:endParaRPr>
+                    </a:p>
+                  </a:txBody>
+                  <a:tcPr marL="9525" marR="9525" marT="9525" marB="0" anchor="b"/>
+                </a:tc>
+                <a:tc>
+                  <a:txBody>
+                    <a:bodyPr/>
+                    <a:lstStyle/>
+                    <a:p>
+                      <a:pPr algn="l" fontAlgn="b"/>
+                      <a:r>
+                        <a:rPr lang="en-US" sz="1600" b="0" u="none" strike="noStrike" dirty="0">
+                          <a:solidFill>
+                            <a:srgbClr val="000000"/>
+                          </a:solidFill>
+                          <a:effectLst/>
+                        </a:rPr>
+                        <a:t>Panic (N=13)</a:t>
+                      </a:r>
+                      <a:endParaRPr lang="en-US" sz="1600" b="0" i="0" u="none" strike="noStrike" dirty="0">
+                        <a:solidFill>
+                          <a:srgbClr val="000000"/>
+                        </a:solidFill>
+                        <a:effectLst/>
+                        <a:latin typeface="Aptos Narrow" panose="020B0004020202020204" pitchFamily="34" charset="0"/>
+                      </a:endParaRPr>
+                    </a:p>
+                  </a:txBody>
+                  <a:tcPr marL="9525" marR="9525" marT="9525" marB="0" anchor="b"/>
+                </a:tc>
+                <a:tc>
+                  <a:txBody>
+                    <a:bodyPr/>
+                    <a:lstStyle/>
+                    <a:p>
+                      <a:pPr algn="l" fontAlgn="b"/>
+                      <a:r>
+                        <a:rPr lang="en-US" sz="1600" b="0" u="none" strike="noStrike">
+                          <a:solidFill>
+                            <a:srgbClr val="000000"/>
+                          </a:solidFill>
+                          <a:effectLst/>
+                        </a:rPr>
+                        <a:t>Other (N=38)</a:t>
+                      </a:r>
+                      <a:endParaRPr lang="en-US" sz="1600" b="0" i="0" u="none" strike="noStrike">
+                        <a:solidFill>
+                          <a:srgbClr val="000000"/>
+                        </a:solidFill>
+                        <a:effectLst/>
+                        <a:latin typeface="Aptos Narrow" panose="020B0004020202020204" pitchFamily="34" charset="0"/>
+                      </a:endParaRPr>
+                    </a:p>
+                  </a:txBody>
+                  <a:tcPr marL="9525" marR="9525" marT="9525" marB="0" anchor="b"/>
+                </a:tc>
+                <a:extLst>
+                  <a:ext uri="{0D108BD9-81ED-4DB2-BD59-A6C34878D82A}">
+                    <a16:rowId xmlns:a16="http://schemas.microsoft.com/office/drawing/2014/main" val="1682231075"/>
+                  </a:ext>
+                </a:extLst>
+              </a:tr>
+              <a:tr h="376117">
+                <a:tc>
+                  <a:txBody>
+                    <a:bodyPr/>
+                    <a:lstStyle/>
+                    <a:p>
+                      <a:pPr algn="l" fontAlgn="b"/>
+                      <a:r>
+                        <a:rPr lang="en-US" sz="1600" b="0" i="1" u="none" strike="noStrike" dirty="0">
+                          <a:solidFill>
+                            <a:srgbClr val="000000"/>
+                          </a:solidFill>
+                          <a:effectLst/>
+                          <a:latin typeface="Aptos Narrow" panose="020B0004020202020204" pitchFamily="34" charset="0"/>
+                        </a:rPr>
+                        <a:t>Variable</a:t>
+                      </a:r>
+                    </a:p>
+                  </a:txBody>
+                  <a:tcPr marL="9525" marR="9525" marT="9525" marB="0" anchor="b"/>
+                </a:tc>
+                <a:tc>
+                  <a:txBody>
+                    <a:bodyPr/>
+                    <a:lstStyle/>
+                    <a:p>
+                      <a:pPr algn="ctr" fontAlgn="b"/>
+                      <a:r>
+                        <a:rPr lang="en-US" sz="1600" b="0" u="none" strike="noStrike">
+                          <a:solidFill>
+                            <a:srgbClr val="000000"/>
+                          </a:solidFill>
+                          <a:effectLst/>
+                        </a:rPr>
+                        <a:t>M(SD)</a:t>
+                      </a:r>
+                      <a:endParaRPr lang="en-US" sz="1600" b="0" i="0" u="none" strike="noStrike">
+                        <a:solidFill>
+                          <a:srgbClr val="000000"/>
+                        </a:solidFill>
+                        <a:effectLst/>
+                        <a:latin typeface="Aptos Narrow" panose="020B0004020202020204" pitchFamily="34" charset="0"/>
+                      </a:endParaRPr>
+                    </a:p>
+                  </a:txBody>
+                  <a:tcPr marL="9525" marR="9525" marT="9525" marB="0" anchor="b"/>
+                </a:tc>
+                <a:tc>
+                  <a:txBody>
+                    <a:bodyPr/>
+                    <a:lstStyle/>
+                    <a:p>
+                      <a:pPr algn="ctr" fontAlgn="b"/>
+                      <a:r>
+                        <a:rPr lang="en-US" sz="1600" b="0" u="none" strike="noStrike">
+                          <a:solidFill>
+                            <a:srgbClr val="000000"/>
+                          </a:solidFill>
+                          <a:effectLst/>
+                        </a:rPr>
+                        <a:t>M(SD)</a:t>
+                      </a:r>
+                      <a:endParaRPr lang="en-US" sz="1600" b="0" i="0" u="none" strike="noStrike">
+                        <a:solidFill>
+                          <a:srgbClr val="000000"/>
+                        </a:solidFill>
+                        <a:effectLst/>
+                        <a:latin typeface="Aptos Narrow" panose="020B0004020202020204" pitchFamily="34" charset="0"/>
+                      </a:endParaRPr>
+                    </a:p>
+                  </a:txBody>
+                  <a:tcPr marL="9525" marR="9525" marT="9525" marB="0" anchor="b"/>
+                </a:tc>
+                <a:extLst>
+                  <a:ext uri="{0D108BD9-81ED-4DB2-BD59-A6C34878D82A}">
+                    <a16:rowId xmlns:a16="http://schemas.microsoft.com/office/drawing/2014/main" val="71356708"/>
+                  </a:ext>
+                </a:extLst>
+              </a:tr>
+              <a:tr h="376117">
+                <a:tc>
+                  <a:txBody>
+                    <a:bodyPr/>
+                    <a:lstStyle/>
+                    <a:p>
+                      <a:pPr algn="l" fontAlgn="b"/>
+                      <a:r>
+                        <a:rPr lang="en-US" sz="1600" b="0" u="none" strike="noStrike" dirty="0">
+                          <a:solidFill>
+                            <a:srgbClr val="000000"/>
+                          </a:solidFill>
+                          <a:effectLst/>
+                        </a:rPr>
+                        <a:t>PDSS</a:t>
+                      </a:r>
+                      <a:endParaRPr lang="en-US" sz="1600" b="0" i="0" u="none" strike="noStrike" dirty="0">
+                        <a:solidFill>
+                          <a:srgbClr val="000000"/>
+                        </a:solidFill>
+                        <a:effectLst/>
+                        <a:latin typeface="Aptos Narrow" panose="020B0004020202020204" pitchFamily="34" charset="0"/>
+                      </a:endParaRPr>
+                    </a:p>
+                  </a:txBody>
+                  <a:tcPr marL="9525" marR="9525" marT="9525" marB="0" anchor="b"/>
+                </a:tc>
+                <a:tc>
+                  <a:txBody>
+                    <a:bodyPr/>
+                    <a:lstStyle/>
+                    <a:p>
+                      <a:pPr algn="l" fontAlgn="b"/>
+                      <a:r>
+                        <a:rPr lang="en-US" sz="1600" b="0" u="none" strike="noStrike">
+                          <a:solidFill>
+                            <a:srgbClr val="000000"/>
+                          </a:solidFill>
+                          <a:effectLst/>
+                        </a:rPr>
+                        <a:t>14.15 (3.85)</a:t>
+                      </a:r>
+                      <a:endParaRPr lang="en-US" sz="1600" b="0" i="0" u="none" strike="noStrike">
+                        <a:solidFill>
+                          <a:srgbClr val="000000"/>
+                        </a:solidFill>
+                        <a:effectLst/>
+                        <a:latin typeface="Aptos Narrow" panose="020B0004020202020204" pitchFamily="34" charset="0"/>
+                      </a:endParaRPr>
+                    </a:p>
+                  </a:txBody>
+                  <a:tcPr marL="9525" marR="9525" marT="9525" marB="0" anchor="b"/>
+                </a:tc>
+                <a:tc>
+                  <a:txBody>
+                    <a:bodyPr/>
+                    <a:lstStyle/>
+                    <a:p>
+                      <a:pPr algn="l" fontAlgn="b"/>
+                      <a:r>
+                        <a:rPr lang="en-US" sz="1600" b="0" u="none" strike="noStrike">
+                          <a:solidFill>
+                            <a:srgbClr val="000000"/>
+                          </a:solidFill>
+                          <a:effectLst/>
+                        </a:rPr>
+                        <a:t>12.13 (3.29)</a:t>
+                      </a:r>
+                      <a:endParaRPr lang="en-US" sz="1600" b="0" i="0" u="none" strike="noStrike">
+                        <a:solidFill>
+                          <a:srgbClr val="000000"/>
+                        </a:solidFill>
+                        <a:effectLst/>
+                        <a:latin typeface="Aptos Narrow" panose="020B0004020202020204" pitchFamily="34" charset="0"/>
+                      </a:endParaRPr>
+                    </a:p>
+                  </a:txBody>
+                  <a:tcPr marL="9525" marR="9525" marT="9525" marB="0" anchor="b"/>
+                </a:tc>
+                <a:extLst>
+                  <a:ext uri="{0D108BD9-81ED-4DB2-BD59-A6C34878D82A}">
+                    <a16:rowId xmlns:a16="http://schemas.microsoft.com/office/drawing/2014/main" val="1456458515"/>
+                  </a:ext>
+                </a:extLst>
+              </a:tr>
+              <a:tr h="376117">
+                <a:tc>
+                  <a:txBody>
+                    <a:bodyPr/>
+                    <a:lstStyle/>
+                    <a:p>
+                      <a:pPr algn="l" fontAlgn="b"/>
+                      <a:r>
+                        <a:rPr lang="en-US" sz="1600" b="0" u="none" strike="noStrike" dirty="0">
+                          <a:solidFill>
+                            <a:srgbClr val="000000"/>
+                          </a:solidFill>
+                          <a:effectLst/>
+                        </a:rPr>
+                        <a:t>Disorders</a:t>
+                      </a:r>
+                      <a:endParaRPr lang="en-US" sz="1600" b="0" i="0" u="none" strike="noStrike" dirty="0">
+                        <a:solidFill>
+                          <a:srgbClr val="000000"/>
+                        </a:solidFill>
+                        <a:effectLst/>
+                        <a:latin typeface="Aptos Narrow" panose="020B0004020202020204" pitchFamily="34" charset="0"/>
+                      </a:endParaRPr>
+                    </a:p>
+                  </a:txBody>
+                  <a:tcPr marL="9525" marR="9525" marT="9525" marB="0" anchor="b"/>
+                </a:tc>
+                <a:tc>
+                  <a:txBody>
+                    <a:bodyPr/>
+                    <a:lstStyle/>
+                    <a:p>
+                      <a:pPr algn="l" fontAlgn="b"/>
+                      <a:r>
+                        <a:rPr lang="en-US" sz="1600" b="0" u="none" strike="noStrike">
+                          <a:solidFill>
+                            <a:srgbClr val="000000"/>
+                          </a:solidFill>
+                          <a:effectLst/>
+                        </a:rPr>
+                        <a:t>4.54 (14.15)</a:t>
+                      </a:r>
+                      <a:endParaRPr lang="en-US" sz="1600" b="0" i="0" u="none" strike="noStrike">
+                        <a:solidFill>
+                          <a:srgbClr val="000000"/>
+                        </a:solidFill>
+                        <a:effectLst/>
+                        <a:latin typeface="Aptos Narrow" panose="020B0004020202020204" pitchFamily="34" charset="0"/>
+                      </a:endParaRPr>
+                    </a:p>
+                  </a:txBody>
+                  <a:tcPr marL="9525" marR="9525" marT="9525" marB="0" anchor="b"/>
+                </a:tc>
+                <a:tc>
+                  <a:txBody>
+                    <a:bodyPr/>
+                    <a:lstStyle/>
+                    <a:p>
+                      <a:pPr algn="l" fontAlgn="b"/>
+                      <a:r>
+                        <a:rPr lang="en-US" sz="1600" b="0" u="none" strike="noStrike">
+                          <a:solidFill>
+                            <a:srgbClr val="000000"/>
+                          </a:solidFill>
+                          <a:effectLst/>
+                        </a:rPr>
+                        <a:t>5.21 (12.13)</a:t>
+                      </a:r>
+                      <a:endParaRPr lang="en-US" sz="1600" b="0" i="0" u="none" strike="noStrike">
+                        <a:solidFill>
+                          <a:srgbClr val="000000"/>
+                        </a:solidFill>
+                        <a:effectLst/>
+                        <a:latin typeface="Aptos Narrow" panose="020B0004020202020204" pitchFamily="34" charset="0"/>
+                      </a:endParaRPr>
+                    </a:p>
+                  </a:txBody>
+                  <a:tcPr marL="9525" marR="9525" marT="9525" marB="0" anchor="b"/>
+                </a:tc>
+                <a:extLst>
+                  <a:ext uri="{0D108BD9-81ED-4DB2-BD59-A6C34878D82A}">
+                    <a16:rowId xmlns:a16="http://schemas.microsoft.com/office/drawing/2014/main" val="1314038434"/>
+                  </a:ext>
+                </a:extLst>
+              </a:tr>
+              <a:tr h="376117">
+                <a:tc>
+                  <a:txBody>
+                    <a:bodyPr/>
+                    <a:lstStyle/>
+                    <a:p>
+                      <a:pPr algn="l" fontAlgn="b"/>
+                      <a:r>
+                        <a:rPr lang="en-US" sz="1600" b="0" u="none" strike="noStrike">
+                          <a:solidFill>
+                            <a:srgbClr val="000000"/>
+                          </a:solidFill>
+                          <a:effectLst/>
+                        </a:rPr>
+                        <a:t>Total Modules</a:t>
+                      </a:r>
+                      <a:endParaRPr lang="en-US" sz="1600" b="0" i="0" u="none" strike="noStrike">
+                        <a:solidFill>
+                          <a:srgbClr val="000000"/>
+                        </a:solidFill>
+                        <a:effectLst/>
+                        <a:latin typeface="Aptos Narrow" panose="020B0004020202020204" pitchFamily="34" charset="0"/>
+                      </a:endParaRPr>
+                    </a:p>
+                  </a:txBody>
+                  <a:tcPr marL="9525" marR="9525" marT="9525" marB="0" anchor="b"/>
+                </a:tc>
+                <a:tc>
+                  <a:txBody>
+                    <a:bodyPr/>
+                    <a:lstStyle/>
+                    <a:p>
+                      <a:pPr algn="l" fontAlgn="b"/>
+                      <a:r>
+                        <a:rPr lang="en-US" sz="1600" b="0" u="none" strike="noStrike">
+                          <a:solidFill>
+                            <a:srgbClr val="000000"/>
+                          </a:solidFill>
+                          <a:effectLst/>
+                        </a:rPr>
+                        <a:t>3.85 (2.66)</a:t>
+                      </a:r>
+                      <a:endParaRPr lang="en-US" sz="1600" b="0" i="0" u="none" strike="noStrike">
+                        <a:solidFill>
+                          <a:srgbClr val="000000"/>
+                        </a:solidFill>
+                        <a:effectLst/>
+                        <a:latin typeface="Aptos Narrow" panose="020B0004020202020204" pitchFamily="34" charset="0"/>
+                      </a:endParaRPr>
+                    </a:p>
+                  </a:txBody>
+                  <a:tcPr marL="9525" marR="9525" marT="9525" marB="0" anchor="b"/>
+                </a:tc>
+                <a:tc>
+                  <a:txBody>
+                    <a:bodyPr/>
+                    <a:lstStyle/>
+                    <a:p>
+                      <a:pPr algn="l" fontAlgn="b"/>
+                      <a:r>
+                        <a:rPr lang="en-US" sz="1600" b="0" u="none" strike="noStrike" dirty="0">
+                          <a:solidFill>
+                            <a:srgbClr val="000000"/>
+                          </a:solidFill>
+                          <a:effectLst/>
+                        </a:rPr>
+                        <a:t>3.29 (3.15)</a:t>
+                      </a:r>
+                      <a:endParaRPr lang="en-US" sz="1600" b="0" i="0" u="none" strike="noStrike" dirty="0">
+                        <a:solidFill>
+                          <a:srgbClr val="000000"/>
+                        </a:solidFill>
+                        <a:effectLst/>
+                        <a:latin typeface="Aptos Narrow" panose="020B0004020202020204" pitchFamily="34" charset="0"/>
+                      </a:endParaRPr>
+                    </a:p>
+                  </a:txBody>
+                  <a:tcPr marL="9525" marR="9525" marT="9525" marB="0" anchor="b"/>
+                </a:tc>
+                <a:extLst>
+                  <a:ext uri="{0D108BD9-81ED-4DB2-BD59-A6C34878D82A}">
+                    <a16:rowId xmlns:a16="http://schemas.microsoft.com/office/drawing/2014/main" val="3264027385"/>
+                  </a:ext>
+                </a:extLst>
+              </a:tr>
+              <a:tr h="376117">
+                <a:tc>
+                  <a:txBody>
+                    <a:bodyPr/>
+                    <a:lstStyle/>
+                    <a:p>
+                      <a:pPr algn="l" fontAlgn="b"/>
+                      <a:r>
+                        <a:rPr lang="en-US" sz="1600" b="0" u="none" strike="noStrike">
+                          <a:solidFill>
+                            <a:srgbClr val="000000"/>
+                          </a:solidFill>
+                          <a:effectLst/>
+                        </a:rPr>
+                        <a:t>Coaching Sessions</a:t>
+                      </a:r>
+                      <a:endParaRPr lang="en-US" sz="1600" b="0" i="0" u="none" strike="noStrike">
+                        <a:solidFill>
+                          <a:srgbClr val="000000"/>
+                        </a:solidFill>
+                        <a:effectLst/>
+                        <a:latin typeface="Aptos Narrow" panose="020B0004020202020204" pitchFamily="34" charset="0"/>
+                      </a:endParaRPr>
+                    </a:p>
+                  </a:txBody>
+                  <a:tcPr marL="9525" marR="9525" marT="9525" marB="0" anchor="b"/>
+                </a:tc>
+                <a:tc>
+                  <a:txBody>
+                    <a:bodyPr/>
+                    <a:lstStyle/>
+                    <a:p>
+                      <a:pPr algn="l" fontAlgn="b"/>
+                      <a:r>
+                        <a:rPr lang="en-US" sz="1600" b="0" u="none" strike="noStrike">
+                          <a:solidFill>
+                            <a:srgbClr val="000000"/>
+                          </a:solidFill>
+                          <a:effectLst/>
+                        </a:rPr>
+                        <a:t>4.69 (4.54)</a:t>
+                      </a:r>
+                      <a:endParaRPr lang="en-US" sz="1600" b="0" i="0" u="none" strike="noStrike">
+                        <a:solidFill>
+                          <a:srgbClr val="000000"/>
+                        </a:solidFill>
+                        <a:effectLst/>
+                        <a:latin typeface="Aptos Narrow" panose="020B0004020202020204" pitchFamily="34" charset="0"/>
+                      </a:endParaRPr>
+                    </a:p>
+                  </a:txBody>
+                  <a:tcPr marL="9525" marR="9525" marT="9525" marB="0" anchor="b"/>
+                </a:tc>
+                <a:tc>
+                  <a:txBody>
+                    <a:bodyPr/>
+                    <a:lstStyle/>
+                    <a:p>
+                      <a:pPr algn="l" fontAlgn="b"/>
+                      <a:r>
+                        <a:rPr lang="en-US" sz="1600" b="0" u="none" strike="noStrike" dirty="0">
+                          <a:solidFill>
+                            <a:srgbClr val="000000"/>
+                          </a:solidFill>
+                          <a:effectLst/>
+                        </a:rPr>
+                        <a:t>4.49 (5.21)</a:t>
+                      </a:r>
+                      <a:endParaRPr lang="en-US" sz="1600" b="0" i="0" u="none" strike="noStrike" dirty="0">
+                        <a:solidFill>
+                          <a:srgbClr val="000000"/>
+                        </a:solidFill>
+                        <a:effectLst/>
+                        <a:latin typeface="Aptos Narrow" panose="020B0004020202020204" pitchFamily="34" charset="0"/>
+                      </a:endParaRPr>
+                    </a:p>
+                  </a:txBody>
+                  <a:tcPr marL="9525" marR="9525" marT="9525" marB="0" anchor="b"/>
+                </a:tc>
+                <a:extLst>
+                  <a:ext uri="{0D108BD9-81ED-4DB2-BD59-A6C34878D82A}">
+                    <a16:rowId xmlns:a16="http://schemas.microsoft.com/office/drawing/2014/main" val="3397786824"/>
+                  </a:ext>
+                </a:extLst>
+              </a:tr>
+            </a:tbl>
+          </a:graphicData>
+        </a:graphic>
+      </p:graphicFrame>
+      <p:sp>
+        <p:nvSpPr>
+          <p:cNvPr id="9" name="TextBox 8">
+            <a:extLst>
+              <a:ext uri="{FF2B5EF4-FFF2-40B4-BE49-F238E27FC236}">
+                <a16:creationId xmlns:a16="http://schemas.microsoft.com/office/drawing/2014/main" id="{3F983784-60FF-832A-A949-55A8EDD25279}"/>
+              </a:ext>
+            </a:extLst>
+          </p:cNvPr>
+          <p:cNvSpPr txBox="1"/>
           <p:nvPr/>
-        </p:nvPicPr>
-        <p:blipFill>
-          <a:blip r:embed="rId3"/>
-          <a:srcRect t="12692"/>
-          <a:stretch/>
-        </p:blipFill>
+        </p:nvSpPr>
         <p:spPr>
           <a:xfrm>
-            <a:off x="5473149" y="2333074"/>
-            <a:ext cx="6007100" cy="3448405"/>
+            <a:off x="6514547" y="1325563"/>
+            <a:ext cx="2268057" cy="369332"/>
           </a:xfrm>
           <a:prstGeom prst="rect">
             <a:avLst/>
           </a:prstGeom>
+          <a:noFill/>
         </p:spPr>
-      </p:pic>
+        <p:txBody>
+          <a:bodyPr wrap="none" rtlCol="0">
+            <a:spAutoFit/>
+          </a:bodyPr>
+          <a:lstStyle/>
+          <a:p>
+            <a:r>
+              <a:rPr lang="en-US" dirty="0"/>
+              <a:t>Clinical Characteristics</a:t>
+            </a:r>
+          </a:p>
+        </p:txBody>
+      </p:sp>
     </p:spTree>
     <p:extLst>
       <p:ext uri="{BB962C8B-B14F-4D97-AF65-F5344CB8AC3E}">
@@ -8440,7 +10889,7 @@
 </p:sld>
 </file>
 
-<file path=ppt/slides/slide5.xml><?xml version="1.0" encoding="utf-8"?>
+<file path=ppt/slides/slide6.xml><?xml version="1.0" encoding="utf-8"?>
 <p:sld xmlns:a="http://schemas.openxmlformats.org/drawingml/2006/main" xmlns:r="http://schemas.openxmlformats.org/officeDocument/2006/relationships" xmlns:p="http://schemas.openxmlformats.org/presentationml/2006/main">
   <p:cSld>
     <p:spTree>
@@ -8498,10 +10947,10 @@
       </p:sp>
       <p:pic>
         <p:nvPicPr>
-          <p:cNvPr id="3" name="Picture 2">
-            <a:extLst>
-              <a:ext uri="{FF2B5EF4-FFF2-40B4-BE49-F238E27FC236}">
-                <a16:creationId xmlns:a16="http://schemas.microsoft.com/office/drawing/2014/main" id="{3E36BA92-4765-A975-8E63-DCA9C7D9A08A}"/>
+          <p:cNvPr id="5" name="Picture 4">
+            <a:extLst>
+              <a:ext uri="{FF2B5EF4-FFF2-40B4-BE49-F238E27FC236}">
+                <a16:creationId xmlns:a16="http://schemas.microsoft.com/office/drawing/2014/main" id="{4569EDEE-98F2-D358-F01D-F7BC48BCE6FD}"/>
               </a:ext>
             </a:extLst>
           </p:cNvPr>
@@ -8518,8 +10967,8 @@
         </p:blipFill>
         <p:spPr>
           <a:xfrm>
-            <a:off x="122547" y="1484589"/>
-            <a:ext cx="5973453" cy="4969220"/>
+            <a:off x="230832" y="1816651"/>
+            <a:ext cx="5685699" cy="4319106"/>
           </a:xfrm>
           <a:prstGeom prst="rect">
             <a:avLst/>
@@ -8528,10 +10977,10 @@
       </p:pic>
       <p:pic>
         <p:nvPicPr>
-          <p:cNvPr id="4" name="Picture 3">
-            <a:extLst>
-              <a:ext uri="{FF2B5EF4-FFF2-40B4-BE49-F238E27FC236}">
-                <a16:creationId xmlns:a16="http://schemas.microsoft.com/office/drawing/2014/main" id="{3D7B2EED-B2D1-C549-F8BC-51E1097C4F44}"/>
+          <p:cNvPr id="6" name="Picture 5">
+            <a:extLst>
+              <a:ext uri="{FF2B5EF4-FFF2-40B4-BE49-F238E27FC236}">
+                <a16:creationId xmlns:a16="http://schemas.microsoft.com/office/drawing/2014/main" id="{00E53C6D-E8CD-0EED-DA53-EA78B5D49C12}"/>
               </a:ext>
             </a:extLst>
           </p:cNvPr>
@@ -8548,8 +10997,8 @@
         </p:blipFill>
         <p:spPr>
           <a:xfrm>
-            <a:off x="6096000" y="1484589"/>
-            <a:ext cx="5973453" cy="4969220"/>
+            <a:off x="6275470" y="1816651"/>
+            <a:ext cx="5685699" cy="4319106"/>
           </a:xfrm>
           <a:prstGeom prst="rect">
             <a:avLst/>
@@ -8569,7 +11018,7 @@
 </p:sld>
 </file>
 
-<file path=ppt/slides/slide6.xml><?xml version="1.0" encoding="utf-8"?>
+<file path=ppt/slides/slide7.xml><?xml version="1.0" encoding="utf-8"?>
 <p:sld xmlns:a="http://schemas.openxmlformats.org/drawingml/2006/main" xmlns:r="http://schemas.openxmlformats.org/officeDocument/2006/relationships" xmlns:p="http://schemas.openxmlformats.org/presentationml/2006/main">
   <p:cSld>
     <p:spTree>
@@ -8627,10 +11076,10 @@
       </p:sp>
       <p:pic>
         <p:nvPicPr>
-          <p:cNvPr id="5" name="Picture 4">
-            <a:extLst>
-              <a:ext uri="{FF2B5EF4-FFF2-40B4-BE49-F238E27FC236}">
-                <a16:creationId xmlns:a16="http://schemas.microsoft.com/office/drawing/2014/main" id="{2C983CDD-E249-0B3B-12F5-1F250E08C632}"/>
+          <p:cNvPr id="7" name="Picture 6">
+            <a:extLst>
+              <a:ext uri="{FF2B5EF4-FFF2-40B4-BE49-F238E27FC236}">
+                <a16:creationId xmlns:a16="http://schemas.microsoft.com/office/drawing/2014/main" id="{25302F52-8E7C-8BB9-EC23-6198F9A7433B}"/>
               </a:ext>
             </a:extLst>
           </p:cNvPr>
@@ -8647,8 +11096,8 @@
         </p:blipFill>
         <p:spPr>
           <a:xfrm>
-            <a:off x="143259" y="1525748"/>
-            <a:ext cx="5700951" cy="4742530"/>
+            <a:off x="141586" y="1710635"/>
+            <a:ext cx="5860147" cy="4451625"/>
           </a:xfrm>
           <a:prstGeom prst="rect">
             <a:avLst/>
@@ -8657,10 +11106,10 @@
       </p:pic>
       <p:pic>
         <p:nvPicPr>
-          <p:cNvPr id="6" name="Picture 5">
-            <a:extLst>
-              <a:ext uri="{FF2B5EF4-FFF2-40B4-BE49-F238E27FC236}">
-                <a16:creationId xmlns:a16="http://schemas.microsoft.com/office/drawing/2014/main" id="{9C21655F-11AF-FBB0-8143-58BB68ADAD3F}"/>
+          <p:cNvPr id="8" name="Picture 7">
+            <a:extLst>
+              <a:ext uri="{FF2B5EF4-FFF2-40B4-BE49-F238E27FC236}">
+                <a16:creationId xmlns:a16="http://schemas.microsoft.com/office/drawing/2014/main" id="{3727FD58-8C60-BDE9-0ADF-1E498DF15C53}"/>
               </a:ext>
             </a:extLst>
           </p:cNvPr>
@@ -8677,8 +11126,8 @@
         </p:blipFill>
         <p:spPr>
           <a:xfrm>
-            <a:off x="6188765" y="1525748"/>
-            <a:ext cx="5700951" cy="4742530"/>
+            <a:off x="6096000" y="1710636"/>
+            <a:ext cx="5860147" cy="4451625"/>
           </a:xfrm>
           <a:prstGeom prst="rect">
             <a:avLst/>
@@ -8698,7 +11147,7 @@
 </p:sld>
 </file>
 
-<file path=ppt/slides/slide7.xml><?xml version="1.0" encoding="utf-8"?>
+<file path=ppt/slides/slide8.xml><?xml version="1.0" encoding="utf-8"?>
 <p:sld xmlns:a="http://schemas.openxmlformats.org/drawingml/2006/main" xmlns:r="http://schemas.openxmlformats.org/officeDocument/2006/relationships" xmlns:p="http://schemas.openxmlformats.org/presentationml/2006/main">
   <p:cSld>
     <p:spTree>
@@ -8756,10 +11205,10 @@
       </p:sp>
       <p:pic>
         <p:nvPicPr>
-          <p:cNvPr id="8" name="Picture 7">
-            <a:extLst>
-              <a:ext uri="{FF2B5EF4-FFF2-40B4-BE49-F238E27FC236}">
-                <a16:creationId xmlns:a16="http://schemas.microsoft.com/office/drawing/2014/main" id="{CD9ED696-5054-8D89-5F91-3B63D74DC3EA}"/>
+          <p:cNvPr id="10" name="Picture 9">
+            <a:extLst>
+              <a:ext uri="{FF2B5EF4-FFF2-40B4-BE49-F238E27FC236}">
+                <a16:creationId xmlns:a16="http://schemas.microsoft.com/office/drawing/2014/main" id="{908F1253-0DEB-C32B-10CA-CEE6899181F2}"/>
               </a:ext>
             </a:extLst>
           </p:cNvPr>
@@ -8776,8 +11225,8 @@
         </p:blipFill>
         <p:spPr>
           <a:xfrm>
-            <a:off x="177455" y="1451749"/>
-            <a:ext cx="5593404" cy="4763522"/>
+            <a:off x="311701" y="1803400"/>
+            <a:ext cx="5668252" cy="4305853"/>
           </a:xfrm>
           <a:prstGeom prst="rect">
             <a:avLst/>
@@ -8786,10 +11235,10 @@
       </p:pic>
       <p:pic>
         <p:nvPicPr>
-          <p:cNvPr id="9" name="Picture 8">
-            <a:extLst>
-              <a:ext uri="{FF2B5EF4-FFF2-40B4-BE49-F238E27FC236}">
-                <a16:creationId xmlns:a16="http://schemas.microsoft.com/office/drawing/2014/main" id="{0BE6E86D-E957-3521-CFD1-466534B19CB1}"/>
+          <p:cNvPr id="11" name="Picture 10">
+            <a:extLst>
+              <a:ext uri="{FF2B5EF4-FFF2-40B4-BE49-F238E27FC236}">
+                <a16:creationId xmlns:a16="http://schemas.microsoft.com/office/drawing/2014/main" id="{0352154B-59A0-C761-FC14-7F8E5E75E3D1}"/>
               </a:ext>
             </a:extLst>
           </p:cNvPr>
@@ -8806,8 +11255,8 @@
         </p:blipFill>
         <p:spPr>
           <a:xfrm>
-            <a:off x="6096000" y="1451749"/>
-            <a:ext cx="5593405" cy="4763523"/>
+            <a:off x="6344569" y="1803399"/>
+            <a:ext cx="5668252" cy="4305853"/>
           </a:xfrm>
           <a:prstGeom prst="rect">
             <a:avLst/>
@@ -8827,7 +11276,7 @@
 </p:sld>
 </file>
 
-<file path=ppt/slides/slide8.xml><?xml version="1.0" encoding="utf-8"?>
+<file path=ppt/slides/slide9.xml><?xml version="1.0" encoding="utf-8"?>
 <p:sld xmlns:a="http://schemas.openxmlformats.org/drawingml/2006/main" xmlns:r="http://schemas.openxmlformats.org/officeDocument/2006/relationships" xmlns:p="http://schemas.openxmlformats.org/presentationml/2006/main">
   <p:cSld>
     <p:spTree>
@@ -8960,104 +11409,6 @@
     <p:extLst>
       <p:ext uri="{BB962C8B-B14F-4D97-AF65-F5344CB8AC3E}">
         <p14:creationId xmlns:p14="http://schemas.microsoft.com/office/powerpoint/2010/main" val="1933484890"/>
-      </p:ext>
-    </p:extLst>
-  </p:cSld>
-  <p:clrMapOvr>
-    <a:masterClrMapping/>
-  </p:clrMapOvr>
-</p:sld>
-</file>
-
-<file path=ppt/slides/slide9.xml><?xml version="1.0" encoding="utf-8"?>
-<p:sld xmlns:a="http://schemas.openxmlformats.org/drawingml/2006/main" xmlns:r="http://schemas.openxmlformats.org/officeDocument/2006/relationships" xmlns:p="http://schemas.openxmlformats.org/presentationml/2006/main">
-  <p:cSld>
-    <p:spTree>
-      <p:nvGrpSpPr>
-        <p:cNvPr id="1" name="">
-          <a:extLst>
-            <a:ext uri="{FF2B5EF4-FFF2-40B4-BE49-F238E27FC236}">
-              <a16:creationId xmlns:a16="http://schemas.microsoft.com/office/drawing/2014/main" id="{7990B1C8-EC6B-629A-CFEC-A0F92F2B7F23}"/>
-            </a:ext>
-          </a:extLst>
-        </p:cNvPr>
-        <p:cNvGrpSpPr/>
-        <p:nvPr/>
-      </p:nvGrpSpPr>
-      <p:grpSpPr>
-        <a:xfrm>
-          <a:off x="0" y="0"/>
-          <a:ext cx="0" cy="0"/>
-          <a:chOff x="0" y="0"/>
-          <a:chExt cx="0" cy="0"/>
-        </a:xfrm>
-      </p:grpSpPr>
-      <p:sp>
-        <p:nvSpPr>
-          <p:cNvPr id="2" name="Title 1">
-            <a:extLst>
-              <a:ext uri="{FF2B5EF4-FFF2-40B4-BE49-F238E27FC236}">
-                <a16:creationId xmlns:a16="http://schemas.microsoft.com/office/drawing/2014/main" id="{1646EA6E-7B7C-05B8-F380-5B350807B4DD}"/>
-              </a:ext>
-            </a:extLst>
-          </p:cNvPr>
-          <p:cNvSpPr>
-            <a:spLocks noGrp="1"/>
-          </p:cNvSpPr>
-          <p:nvPr>
-            <p:ph type="title"/>
-          </p:nvPr>
-        </p:nvSpPr>
-        <p:spPr>
-          <a:xfrm>
-            <a:off x="838200" y="0"/>
-            <a:ext cx="10515600" cy="1325563"/>
-          </a:xfrm>
-        </p:spPr>
-        <p:txBody>
-          <a:bodyPr/>
-          <a:lstStyle/>
-          <a:p>
-            <a:r>
-              <a:rPr lang="en-US" dirty="0"/>
-              <a:t>PDSS Symptom Trajectory by Tx Group</a:t>
-            </a:r>
-          </a:p>
-        </p:txBody>
-      </p:sp>
-      <p:pic>
-        <p:nvPicPr>
-          <p:cNvPr id="4" name="Picture 3">
-            <a:extLst>
-              <a:ext uri="{FF2B5EF4-FFF2-40B4-BE49-F238E27FC236}">
-                <a16:creationId xmlns:a16="http://schemas.microsoft.com/office/drawing/2014/main" id="{E7A6A056-A4DB-4CC4-A45F-0B287EAD30AA}"/>
-              </a:ext>
-            </a:extLst>
-          </p:cNvPr>
-          <p:cNvPicPr>
-            <a:picLocks noChangeAspect="1"/>
-          </p:cNvPicPr>
-          <p:nvPr/>
-        </p:nvPicPr>
-        <p:blipFill>
-          <a:blip r:embed="rId2"/>
-          <a:srcRect t="3972"/>
-          <a:stretch/>
-        </p:blipFill>
-        <p:spPr>
-          <a:xfrm>
-            <a:off x="1063763" y="1325563"/>
-            <a:ext cx="10064474" cy="5041061"/>
-          </a:xfrm>
-          <a:prstGeom prst="rect">
-            <a:avLst/>
-          </a:prstGeom>
-        </p:spPr>
-      </p:pic>
-    </p:spTree>
-    <p:extLst>
-      <p:ext uri="{BB962C8B-B14F-4D97-AF65-F5344CB8AC3E}">
-        <p14:creationId xmlns:p14="http://schemas.microsoft.com/office/powerpoint/2010/main" val="3175728231"/>
       </p:ext>
     </p:extLst>
   </p:cSld>

</xml_diff>